<commit_message>
Se limpian las diapositivas
</commit_message>
<xml_diff>
--- a/docs/index.pptx
+++ b/docs/index.pptx
@@ -17,31 +17,6 @@
     <p:sldId id="265" r:id="rId11"/>
     <p:sldId id="266" r:id="rId12"/>
     <p:sldId id="267" r:id="rId13"/>
-    <p:sldId id="268" r:id="rId14"/>
-    <p:sldId id="269" r:id="rId15"/>
-    <p:sldId id="270" r:id="rId16"/>
-    <p:sldId id="271" r:id="rId17"/>
-    <p:sldId id="272" r:id="rId18"/>
-    <p:sldId id="273" r:id="rId19"/>
-    <p:sldId id="274" r:id="rId20"/>
-    <p:sldId id="275" r:id="rId21"/>
-    <p:sldId id="276" r:id="rId22"/>
-    <p:sldId id="277" r:id="rId23"/>
-    <p:sldId id="278" r:id="rId24"/>
-    <p:sldId id="279" r:id="rId25"/>
-    <p:sldId id="280" r:id="rId26"/>
-    <p:sldId id="281" r:id="rId27"/>
-    <p:sldId id="282" r:id="rId28"/>
-    <p:sldId id="283" r:id="rId29"/>
-    <p:sldId id="284" r:id="rId30"/>
-    <p:sldId id="285" r:id="rId31"/>
-    <p:sldId id="286" r:id="rId32"/>
-    <p:sldId id="287" r:id="rId33"/>
-    <p:sldId id="288" r:id="rId34"/>
-    <p:sldId id="289" r:id="rId35"/>
-    <p:sldId id="290" r:id="rId36"/>
-    <p:sldId id="291" r:id="rId37"/>
-    <p:sldId id="292" r:id="rId38"/>
   </p:sldIdLst>
   <p:sldSz cx="9144000" cy="6858000" type="screen4x3"/>
   <p:notesSz cx="6858000" cy="9144000"/>
@@ -3378,7 +3353,7 @@
             </a:pPr>
             <a:r>
               <a:rPr/>
-              <a:t>Consideraciones previas</a:t>
+              <a:t>4. Kaggle I</a:t>
             </a:r>
           </a:p>
         </p:txBody>
@@ -3401,28 +3376,38 @@
             <a:pPr lvl="0"/>
             <a:r>
               <a:rPr/>
-              <a:t>Cada uno de vosotros tiene un objetivo con el TFM.</a:t>
+              <a:t>El premio del millón de dólares de Netflix </a:t>
+            </a:r>
+            <a:r>
+              <a:rPr>
+                <a:hlinkClick r:id="rId2"/>
+              </a:rPr>
+              <a:t>Link con subscripción</a:t>
+            </a:r>
+            <a:r>
+              <a:rPr/>
+              <a:t>.</a:t>
             </a:r>
           </a:p>
           <a:p>
             <a:pPr lvl="0"/>
             <a:r>
               <a:rPr/>
-              <a:t>No hay plantillas.</a:t>
+              <a:t>Mas de 200.000 usuarios en todo el mundo.</a:t>
             </a:r>
           </a:p>
           <a:p>
             <a:pPr lvl="0"/>
             <a:r>
               <a:rPr/>
-              <a:t>No hay (casi) restricciones.</a:t>
+              <a:t>Zona de test para los algoritmos mas avanzados (xgboost).</a:t>
             </a:r>
           </a:p>
           <a:p>
             <a:pPr lvl="0"/>
             <a:r>
               <a:rPr/>
-              <a:t>Debería ser una continuación de lo que habéis visto.</a:t>
+              <a:t>Adquirido en 2017 por Google.</a:t>
             </a:r>
           </a:p>
         </p:txBody>
@@ -3469,7 +3454,7 @@
             </a:pPr>
             <a:r>
               <a:rPr/>
-              <a:t>Consejos en empresas</a:t>
+              <a:t>4 Kaggle II</a:t>
             </a:r>
           </a:p>
         </p:txBody>
@@ -3492,375 +3477,13 @@
             <a:pPr lvl="0"/>
             <a:r>
               <a:rPr/>
-              <a:t>El tamaño importa.</a:t>
-            </a:r>
-          </a:p>
-          <a:p>
-            <a:pPr lvl="0"/>
-            <a:r>
-              <a:rPr/>
-              <a:t>Juego de las sillas.</a:t>
-            </a:r>
-          </a:p>
-          <a:p>
-            <a:pPr lvl="0"/>
-            <a:r>
-              <a:rPr/>
-              <a:t>No saben lo que hacemos.</a:t>
-            </a:r>
-          </a:p>
-          <a:p>
-            <a:pPr lvl="0"/>
-            <a:r>
-              <a:rPr/>
-              <a:t>¿Nos ven como un riesgo?</a:t>
-            </a:r>
-          </a:p>
-          <a:p>
-            <a:pPr lvl="0"/>
-            <a:r>
-              <a:rPr/>
-              <a:t>Reinos de Taifas.</a:t>
-            </a:r>
-          </a:p>
-          <a:p>
-            <a:pPr lvl="0"/>
-            <a:r>
-              <a:rPr/>
-              <a:t>IT tiene su agenda.</a:t>
+              <a:t>¿Por qué puede ser interesante para el Ayuntamiento?</a:t>
             </a:r>
           </a:p>
         </p:txBody>
       </p:sp>
     </p:spTree>
   </p:cSld>
-  <p:timing>
-    <p:tnLst>
-      <p:par>
-        <p:cTn id="1" dur="indefinite" restart="never" nodeType="tmRoot">
-          <p:childTnLst>
-            <p:seq concurrent="1" nextAc="seek">
-              <p:cTn id="2" dur="indefinite" nodeType="mainSeq">
-                <p:childTnLst>
-                  <p:par>
-                    <p:cTn id="3" fill="hold">
-                      <p:stCondLst>
-                        <p:cond delay="indefinite"/>
-                      </p:stCondLst>
-                      <p:childTnLst>
-                        <p:par>
-                          <p:cTn id="4" fill="hold">
-                            <p:stCondLst>
-                              <p:cond delay="0"/>
-                            </p:stCondLst>
-                            <p:childTnLst>
-                              <p:par>
-                                <p:cTn id="5" presetID="1" presetClass="entr" presetSubtype="0" fill="hold" grpId="0" nodeType="clickEffect">
-                                  <p:stCondLst>
-                                    <p:cond delay="0"/>
-                                  </p:stCondLst>
-                                  <p:childTnLst>
-                                    <p:set>
-                                      <p:cBhvr>
-                                        <p:cTn id="6" dur="1" fill="hold">
-                                          <p:stCondLst>
-                                            <p:cond delay="0"/>
-                                          </p:stCondLst>
-                                        </p:cTn>
-                                        <p:tgtEl>
-                                          <p:spTgt spid="3">
-                                            <p:txEl>
-                                              <p:pRg st="0" end="0"/>
-                                            </p:txEl>
-                                          </p:spTgt>
-                                        </p:tgtEl>
-                                        <p:attrNameLst>
-                                          <p:attrName>style.visibility</p:attrName>
-                                        </p:attrNameLst>
-                                      </p:cBhvr>
-                                      <p:to>
-                                        <p:strVal val="visible"/>
-                                      </p:to>
-                                    </p:set>
-                                  </p:childTnLst>
-                                </p:cTn>
-                              </p:par>
-                            </p:childTnLst>
-                          </p:cTn>
-                        </p:par>
-                      </p:childTnLst>
-                    </p:cTn>
-                  </p:par>
-                  <p:par>
-                    <p:cTn id="7" fill="hold">
-                      <p:stCondLst>
-                        <p:cond delay="indefinite"/>
-                      </p:stCondLst>
-                      <p:childTnLst>
-                        <p:par>
-                          <p:cTn id="8" fill="hold">
-                            <p:stCondLst>
-                              <p:cond delay="0"/>
-                            </p:stCondLst>
-                            <p:childTnLst>
-                              <p:par>
-                                <p:cTn id="9" presetID="1" presetClass="entr" presetSubtype="0" fill="hold" grpId="0" nodeType="clickEffect">
-                                  <p:stCondLst>
-                                    <p:cond delay="0"/>
-                                  </p:stCondLst>
-                                  <p:childTnLst>
-                                    <p:set>
-                                      <p:cBhvr>
-                                        <p:cTn id="10" dur="1" fill="hold">
-                                          <p:stCondLst>
-                                            <p:cond delay="0"/>
-                                          </p:stCondLst>
-                                        </p:cTn>
-                                        <p:tgtEl>
-                                          <p:spTgt spid="3">
-                                            <p:txEl>
-                                              <p:pRg st="1" end="1"/>
-                                            </p:txEl>
-                                          </p:spTgt>
-                                        </p:tgtEl>
-                                        <p:attrNameLst>
-                                          <p:attrName>style.visibility</p:attrName>
-                                        </p:attrNameLst>
-                                      </p:cBhvr>
-                                      <p:to>
-                                        <p:strVal val="visible"/>
-                                      </p:to>
-                                    </p:set>
-                                  </p:childTnLst>
-                                </p:cTn>
-                              </p:par>
-                            </p:childTnLst>
-                          </p:cTn>
-                        </p:par>
-                      </p:childTnLst>
-                    </p:cTn>
-                  </p:par>
-                  <p:par>
-                    <p:cTn id="11" fill="hold">
-                      <p:stCondLst>
-                        <p:cond delay="indefinite"/>
-                      </p:stCondLst>
-                      <p:childTnLst>
-                        <p:par>
-                          <p:cTn id="12" fill="hold">
-                            <p:stCondLst>
-                              <p:cond delay="0"/>
-                            </p:stCondLst>
-                            <p:childTnLst>
-                              <p:par>
-                                <p:cTn id="13" presetID="1" presetClass="entr" presetSubtype="0" fill="hold" grpId="0" nodeType="clickEffect">
-                                  <p:stCondLst>
-                                    <p:cond delay="0"/>
-                                  </p:stCondLst>
-                                  <p:childTnLst>
-                                    <p:set>
-                                      <p:cBhvr>
-                                        <p:cTn id="14" dur="1" fill="hold">
-                                          <p:stCondLst>
-                                            <p:cond delay="0"/>
-                                          </p:stCondLst>
-                                        </p:cTn>
-                                        <p:tgtEl>
-                                          <p:spTgt spid="3">
-                                            <p:txEl>
-                                              <p:pRg st="2" end="2"/>
-                                            </p:txEl>
-                                          </p:spTgt>
-                                        </p:tgtEl>
-                                        <p:attrNameLst>
-                                          <p:attrName>style.visibility</p:attrName>
-                                        </p:attrNameLst>
-                                      </p:cBhvr>
-                                      <p:to>
-                                        <p:strVal val="visible"/>
-                                      </p:to>
-                                    </p:set>
-                                  </p:childTnLst>
-                                </p:cTn>
-                              </p:par>
-                            </p:childTnLst>
-                          </p:cTn>
-                        </p:par>
-                      </p:childTnLst>
-                    </p:cTn>
-                  </p:par>
-                  <p:par>
-                    <p:cTn id="15" fill="hold">
-                      <p:stCondLst>
-                        <p:cond delay="indefinite"/>
-                      </p:stCondLst>
-                      <p:childTnLst>
-                        <p:par>
-                          <p:cTn id="16" fill="hold">
-                            <p:stCondLst>
-                              <p:cond delay="0"/>
-                            </p:stCondLst>
-                            <p:childTnLst>
-                              <p:par>
-                                <p:cTn id="17" presetID="1" presetClass="entr" presetSubtype="0" fill="hold" grpId="0" nodeType="clickEffect">
-                                  <p:stCondLst>
-                                    <p:cond delay="0"/>
-                                  </p:stCondLst>
-                                  <p:childTnLst>
-                                    <p:set>
-                                      <p:cBhvr>
-                                        <p:cTn id="18" dur="1" fill="hold">
-                                          <p:stCondLst>
-                                            <p:cond delay="0"/>
-                                          </p:stCondLst>
-                                        </p:cTn>
-                                        <p:tgtEl>
-                                          <p:spTgt spid="3">
-                                            <p:txEl>
-                                              <p:pRg st="3" end="3"/>
-                                            </p:txEl>
-                                          </p:spTgt>
-                                        </p:tgtEl>
-                                        <p:attrNameLst>
-                                          <p:attrName>style.visibility</p:attrName>
-                                        </p:attrNameLst>
-                                      </p:cBhvr>
-                                      <p:to>
-                                        <p:strVal val="visible"/>
-                                      </p:to>
-                                    </p:set>
-                                  </p:childTnLst>
-                                </p:cTn>
-                              </p:par>
-                            </p:childTnLst>
-                          </p:cTn>
-                        </p:par>
-                      </p:childTnLst>
-                    </p:cTn>
-                  </p:par>
-                  <p:par>
-                    <p:cTn id="19" fill="hold">
-                      <p:stCondLst>
-                        <p:cond delay="indefinite"/>
-                      </p:stCondLst>
-                      <p:childTnLst>
-                        <p:par>
-                          <p:cTn id="20" fill="hold">
-                            <p:stCondLst>
-                              <p:cond delay="0"/>
-                            </p:stCondLst>
-                            <p:childTnLst>
-                              <p:par>
-                                <p:cTn id="21" presetID="1" presetClass="entr" presetSubtype="0" fill="hold" grpId="0" nodeType="clickEffect">
-                                  <p:stCondLst>
-                                    <p:cond delay="0"/>
-                                  </p:stCondLst>
-                                  <p:childTnLst>
-                                    <p:set>
-                                      <p:cBhvr>
-                                        <p:cTn id="22" dur="1" fill="hold">
-                                          <p:stCondLst>
-                                            <p:cond delay="0"/>
-                                          </p:stCondLst>
-                                        </p:cTn>
-                                        <p:tgtEl>
-                                          <p:spTgt spid="3">
-                                            <p:txEl>
-                                              <p:pRg st="4" end="4"/>
-                                            </p:txEl>
-                                          </p:spTgt>
-                                        </p:tgtEl>
-                                        <p:attrNameLst>
-                                          <p:attrName>style.visibility</p:attrName>
-                                        </p:attrNameLst>
-                                      </p:cBhvr>
-                                      <p:to>
-                                        <p:strVal val="visible"/>
-                                      </p:to>
-                                    </p:set>
-                                  </p:childTnLst>
-                                </p:cTn>
-                              </p:par>
-                            </p:childTnLst>
-                          </p:cTn>
-                        </p:par>
-                      </p:childTnLst>
-                    </p:cTn>
-                  </p:par>
-                  <p:par>
-                    <p:cTn id="23" fill="hold">
-                      <p:stCondLst>
-                        <p:cond delay="indefinite"/>
-                      </p:stCondLst>
-                      <p:childTnLst>
-                        <p:par>
-                          <p:cTn id="24" fill="hold">
-                            <p:stCondLst>
-                              <p:cond delay="0"/>
-                            </p:stCondLst>
-                            <p:childTnLst>
-                              <p:par>
-                                <p:cTn id="25" presetID="1" presetClass="entr" presetSubtype="0" fill="hold" grpId="0" nodeType="clickEffect">
-                                  <p:stCondLst>
-                                    <p:cond delay="0"/>
-                                  </p:stCondLst>
-                                  <p:childTnLst>
-                                    <p:set>
-                                      <p:cBhvr>
-                                        <p:cTn id="26" dur="1" fill="hold">
-                                          <p:stCondLst>
-                                            <p:cond delay="0"/>
-                                          </p:stCondLst>
-                                        </p:cTn>
-                                        <p:tgtEl>
-                                          <p:spTgt spid="3">
-                                            <p:txEl>
-                                              <p:pRg st="5" end="5"/>
-                                            </p:txEl>
-                                          </p:spTgt>
-                                        </p:tgtEl>
-                                        <p:attrNameLst>
-                                          <p:attrName>style.visibility</p:attrName>
-                                        </p:attrNameLst>
-                                      </p:cBhvr>
-                                      <p:to>
-                                        <p:strVal val="visible"/>
-                                      </p:to>
-                                    </p:set>
-                                  </p:childTnLst>
-                                </p:cTn>
-                              </p:par>
-                            </p:childTnLst>
-                          </p:cTn>
-                        </p:par>
-                      </p:childTnLst>
-                    </p:cTn>
-                  </p:par>
-                </p:childTnLst>
-              </p:cTn>
-              <p:prevCondLst>
-                <p:cond evt="onPrev" delay="0">
-                  <p:tgtEl>
-                    <p:sldTgt/>
-                  </p:tgtEl>
-                </p:cond>
-              </p:prevCondLst>
-              <p:nextCondLst>
-                <p:cond evt="onNext" delay="0">
-                  <p:tgtEl>
-                    <p:sldTgt/>
-                  </p:tgtEl>
-                </p:cond>
-              </p:nextCondLst>
-            </p:seq>
-          </p:childTnLst>
-        </p:cTn>
-      </p:par>
-    </p:tnLst>
-    <p:bldLst>
-      <p:bldP spid="3" grpId="0" uiExpand="1" build="p"/>
-    </p:bldLst>
-  </p:timing>
 </p:sld>
 </file>
 
@@ -3891,7 +3514,12 @@
             <p:ph type="title"/>
           </p:nvPr>
         </p:nvSpPr>
-        <p:spPr/>
+        <p:spPr>
+          <a:xfrm>
+            <a:off x="457200" y="273050"/>
+            <a:ext cx="3008313" cy="1162050"/>
+          </a:xfrm>
+        </p:spPr>
         <p:txBody>
           <a:bodyPr/>
           <a:lstStyle/>
@@ -3901,19 +3529,19 @@
             </a:pPr>
             <a:r>
               <a:rPr/>
-              <a:t>Proyecto de datos V</a:t>
-            </a:r>
-          </a:p>
-        </p:txBody>
-      </p:sp>
-      <p:sp>
-        <p:nvSpPr>
-          <p:cNvPr id="3" name="Content Placeholder 2"/>
-          <p:cNvSpPr>
-            <a:spLocks noGrp="1"/>
-          </p:cNvSpPr>
-          <p:nvPr>
-            <p:ph idx="1"/>
+              <a:t>¡Gracias!</a:t>
+            </a:r>
+          </a:p>
+        </p:txBody>
+      </p:sp>
+      <p:sp>
+        <p:nvSpPr>
+          <p:cNvPr id="4" name="Text Placeholder 3"/>
+          <p:cNvSpPr>
+            <a:spLocks noGrp="1"/>
+          </p:cNvSpPr>
+          <p:nvPr>
+            <p:ph idx="2" sz="half" type="body"/>
           </p:nvPr>
         </p:nvSpPr>
         <p:spPr/>
@@ -3924,909 +3552,13 @@
             <a:pPr lvl="0"/>
             <a:r>
               <a:rPr/>
-              <a:t>Hay casas con mas baños que habitaciones.</a:t>
-            </a:r>
-          </a:p>
-          <a:p>
-            <a:pPr lvl="0"/>
-            <a:r>
-              <a:rPr/>
-              <a:t>División Casa / Apartamento.</a:t>
-            </a:r>
-          </a:p>
-          <a:p>
-            <a:pPr lvl="0"/>
-            <a:r>
-              <a:rPr/>
-              <a:t>Nuevas columnas.</a:t>
-            </a:r>
-          </a:p>
-          <a:p>
-            <a:pPr lvl="0"/>
-            <a:r>
-              <a:rPr/>
-              <a:t>Elementos vacíos.</a:t>
-            </a:r>
-          </a:p>
-          <a:p>
-            <a:pPr lvl="0"/>
-            <a:r>
-              <a:rPr/>
-              <a:t>Validación cruzada.</a:t>
-            </a:r>
-          </a:p>
-          <a:p>
-            <a:pPr lvl="0"/>
-            <a:r>
-              <a:rPr/>
-              <a:t>Nuevos algoritmos.</a:t>
-            </a:r>
-          </a:p>
-        </p:txBody>
-      </p:sp>
-    </p:spTree>
-  </p:cSld>
-  <p:timing>
-    <p:tnLst>
-      <p:par>
-        <p:cTn id="1" dur="indefinite" restart="never" nodeType="tmRoot">
-          <p:childTnLst>
-            <p:seq concurrent="1" nextAc="seek">
-              <p:cTn id="2" dur="indefinite" nodeType="mainSeq">
-                <p:childTnLst>
-                  <p:par>
-                    <p:cTn id="3" fill="hold">
-                      <p:stCondLst>
-                        <p:cond delay="indefinite"/>
-                      </p:stCondLst>
-                      <p:childTnLst>
-                        <p:par>
-                          <p:cTn id="4" fill="hold">
-                            <p:stCondLst>
-                              <p:cond delay="0"/>
-                            </p:stCondLst>
-                            <p:childTnLst>
-                              <p:par>
-                                <p:cTn id="5" presetID="1" presetClass="entr" presetSubtype="0" fill="hold" grpId="0" nodeType="clickEffect">
-                                  <p:stCondLst>
-                                    <p:cond delay="0"/>
-                                  </p:stCondLst>
-                                  <p:childTnLst>
-                                    <p:set>
-                                      <p:cBhvr>
-                                        <p:cTn id="6" dur="1" fill="hold">
-                                          <p:stCondLst>
-                                            <p:cond delay="0"/>
-                                          </p:stCondLst>
-                                        </p:cTn>
-                                        <p:tgtEl>
-                                          <p:spTgt spid="3">
-                                            <p:txEl>
-                                              <p:pRg st="0" end="0"/>
-                                            </p:txEl>
-                                          </p:spTgt>
-                                        </p:tgtEl>
-                                        <p:attrNameLst>
-                                          <p:attrName>style.visibility</p:attrName>
-                                        </p:attrNameLst>
-                                      </p:cBhvr>
-                                      <p:to>
-                                        <p:strVal val="visible"/>
-                                      </p:to>
-                                    </p:set>
-                                  </p:childTnLst>
-                                </p:cTn>
-                              </p:par>
-                            </p:childTnLst>
-                          </p:cTn>
-                        </p:par>
-                      </p:childTnLst>
-                    </p:cTn>
-                  </p:par>
-                  <p:par>
-                    <p:cTn id="7" fill="hold">
-                      <p:stCondLst>
-                        <p:cond delay="indefinite"/>
-                      </p:stCondLst>
-                      <p:childTnLst>
-                        <p:par>
-                          <p:cTn id="8" fill="hold">
-                            <p:stCondLst>
-                              <p:cond delay="0"/>
-                            </p:stCondLst>
-                            <p:childTnLst>
-                              <p:par>
-                                <p:cTn id="9" presetID="1" presetClass="entr" presetSubtype="0" fill="hold" grpId="0" nodeType="clickEffect">
-                                  <p:stCondLst>
-                                    <p:cond delay="0"/>
-                                  </p:stCondLst>
-                                  <p:childTnLst>
-                                    <p:set>
-                                      <p:cBhvr>
-                                        <p:cTn id="10" dur="1" fill="hold">
-                                          <p:stCondLst>
-                                            <p:cond delay="0"/>
-                                          </p:stCondLst>
-                                        </p:cTn>
-                                        <p:tgtEl>
-                                          <p:spTgt spid="3">
-                                            <p:txEl>
-                                              <p:pRg st="1" end="1"/>
-                                            </p:txEl>
-                                          </p:spTgt>
-                                        </p:tgtEl>
-                                        <p:attrNameLst>
-                                          <p:attrName>style.visibility</p:attrName>
-                                        </p:attrNameLst>
-                                      </p:cBhvr>
-                                      <p:to>
-                                        <p:strVal val="visible"/>
-                                      </p:to>
-                                    </p:set>
-                                  </p:childTnLst>
-                                </p:cTn>
-                              </p:par>
-                            </p:childTnLst>
-                          </p:cTn>
-                        </p:par>
-                      </p:childTnLst>
-                    </p:cTn>
-                  </p:par>
-                  <p:par>
-                    <p:cTn id="11" fill="hold">
-                      <p:stCondLst>
-                        <p:cond delay="indefinite"/>
-                      </p:stCondLst>
-                      <p:childTnLst>
-                        <p:par>
-                          <p:cTn id="12" fill="hold">
-                            <p:stCondLst>
-                              <p:cond delay="0"/>
-                            </p:stCondLst>
-                            <p:childTnLst>
-                              <p:par>
-                                <p:cTn id="13" presetID="1" presetClass="entr" presetSubtype="0" fill="hold" grpId="0" nodeType="clickEffect">
-                                  <p:stCondLst>
-                                    <p:cond delay="0"/>
-                                  </p:stCondLst>
-                                  <p:childTnLst>
-                                    <p:set>
-                                      <p:cBhvr>
-                                        <p:cTn id="14" dur="1" fill="hold">
-                                          <p:stCondLst>
-                                            <p:cond delay="0"/>
-                                          </p:stCondLst>
-                                        </p:cTn>
-                                        <p:tgtEl>
-                                          <p:spTgt spid="3">
-                                            <p:txEl>
-                                              <p:pRg st="2" end="2"/>
-                                            </p:txEl>
-                                          </p:spTgt>
-                                        </p:tgtEl>
-                                        <p:attrNameLst>
-                                          <p:attrName>style.visibility</p:attrName>
-                                        </p:attrNameLst>
-                                      </p:cBhvr>
-                                      <p:to>
-                                        <p:strVal val="visible"/>
-                                      </p:to>
-                                    </p:set>
-                                  </p:childTnLst>
-                                </p:cTn>
-                              </p:par>
-                            </p:childTnLst>
-                          </p:cTn>
-                        </p:par>
-                      </p:childTnLst>
-                    </p:cTn>
-                  </p:par>
-                  <p:par>
-                    <p:cTn id="15" fill="hold">
-                      <p:stCondLst>
-                        <p:cond delay="indefinite"/>
-                      </p:stCondLst>
-                      <p:childTnLst>
-                        <p:par>
-                          <p:cTn id="16" fill="hold">
-                            <p:stCondLst>
-                              <p:cond delay="0"/>
-                            </p:stCondLst>
-                            <p:childTnLst>
-                              <p:par>
-                                <p:cTn id="17" presetID="1" presetClass="entr" presetSubtype="0" fill="hold" grpId="0" nodeType="clickEffect">
-                                  <p:stCondLst>
-                                    <p:cond delay="0"/>
-                                  </p:stCondLst>
-                                  <p:childTnLst>
-                                    <p:set>
-                                      <p:cBhvr>
-                                        <p:cTn id="18" dur="1" fill="hold">
-                                          <p:stCondLst>
-                                            <p:cond delay="0"/>
-                                          </p:stCondLst>
-                                        </p:cTn>
-                                        <p:tgtEl>
-                                          <p:spTgt spid="3">
-                                            <p:txEl>
-                                              <p:pRg st="3" end="3"/>
-                                            </p:txEl>
-                                          </p:spTgt>
-                                        </p:tgtEl>
-                                        <p:attrNameLst>
-                                          <p:attrName>style.visibility</p:attrName>
-                                        </p:attrNameLst>
-                                      </p:cBhvr>
-                                      <p:to>
-                                        <p:strVal val="visible"/>
-                                      </p:to>
-                                    </p:set>
-                                  </p:childTnLst>
-                                </p:cTn>
-                              </p:par>
-                            </p:childTnLst>
-                          </p:cTn>
-                        </p:par>
-                      </p:childTnLst>
-                    </p:cTn>
-                  </p:par>
-                  <p:par>
-                    <p:cTn id="19" fill="hold">
-                      <p:stCondLst>
-                        <p:cond delay="indefinite"/>
-                      </p:stCondLst>
-                      <p:childTnLst>
-                        <p:par>
-                          <p:cTn id="20" fill="hold">
-                            <p:stCondLst>
-                              <p:cond delay="0"/>
-                            </p:stCondLst>
-                            <p:childTnLst>
-                              <p:par>
-                                <p:cTn id="21" presetID="1" presetClass="entr" presetSubtype="0" fill="hold" grpId="0" nodeType="clickEffect">
-                                  <p:stCondLst>
-                                    <p:cond delay="0"/>
-                                  </p:stCondLst>
-                                  <p:childTnLst>
-                                    <p:set>
-                                      <p:cBhvr>
-                                        <p:cTn id="22" dur="1" fill="hold">
-                                          <p:stCondLst>
-                                            <p:cond delay="0"/>
-                                          </p:stCondLst>
-                                        </p:cTn>
-                                        <p:tgtEl>
-                                          <p:spTgt spid="3">
-                                            <p:txEl>
-                                              <p:pRg st="4" end="4"/>
-                                            </p:txEl>
-                                          </p:spTgt>
-                                        </p:tgtEl>
-                                        <p:attrNameLst>
-                                          <p:attrName>style.visibility</p:attrName>
-                                        </p:attrNameLst>
-                                      </p:cBhvr>
-                                      <p:to>
-                                        <p:strVal val="visible"/>
-                                      </p:to>
-                                    </p:set>
-                                  </p:childTnLst>
-                                </p:cTn>
-                              </p:par>
-                            </p:childTnLst>
-                          </p:cTn>
-                        </p:par>
-                      </p:childTnLst>
-                    </p:cTn>
-                  </p:par>
-                  <p:par>
-                    <p:cTn id="23" fill="hold">
-                      <p:stCondLst>
-                        <p:cond delay="indefinite"/>
-                      </p:stCondLst>
-                      <p:childTnLst>
-                        <p:par>
-                          <p:cTn id="24" fill="hold">
-                            <p:stCondLst>
-                              <p:cond delay="0"/>
-                            </p:stCondLst>
-                            <p:childTnLst>
-                              <p:par>
-                                <p:cTn id="25" presetID="1" presetClass="entr" presetSubtype="0" fill="hold" grpId="0" nodeType="clickEffect">
-                                  <p:stCondLst>
-                                    <p:cond delay="0"/>
-                                  </p:stCondLst>
-                                  <p:childTnLst>
-                                    <p:set>
-                                      <p:cBhvr>
-                                        <p:cTn id="26" dur="1" fill="hold">
-                                          <p:stCondLst>
-                                            <p:cond delay="0"/>
-                                          </p:stCondLst>
-                                        </p:cTn>
-                                        <p:tgtEl>
-                                          <p:spTgt spid="3">
-                                            <p:txEl>
-                                              <p:pRg st="5" end="5"/>
-                                            </p:txEl>
-                                          </p:spTgt>
-                                        </p:tgtEl>
-                                        <p:attrNameLst>
-                                          <p:attrName>style.visibility</p:attrName>
-                                        </p:attrNameLst>
-                                      </p:cBhvr>
-                                      <p:to>
-                                        <p:strVal val="visible"/>
-                                      </p:to>
-                                    </p:set>
-                                  </p:childTnLst>
-                                </p:cTn>
-                              </p:par>
-                            </p:childTnLst>
-                          </p:cTn>
-                        </p:par>
-                      </p:childTnLst>
-                    </p:cTn>
-                  </p:par>
-                </p:childTnLst>
-              </p:cTn>
-              <p:prevCondLst>
-                <p:cond evt="onPrev" delay="0">
-                  <p:tgtEl>
-                    <p:sldTgt/>
-                  </p:tgtEl>
-                </p:cond>
-              </p:prevCondLst>
-              <p:nextCondLst>
-                <p:cond evt="onNext" delay="0">
-                  <p:tgtEl>
-                    <p:sldTgt/>
-                  </p:tgtEl>
-                </p:cond>
-              </p:nextCondLst>
-            </p:seq>
-          </p:childTnLst>
-        </p:cTn>
-      </p:par>
-    </p:tnLst>
-    <p:bldLst>
-      <p:bldP spid="3" grpId="0" uiExpand="1" build="p"/>
-    </p:bldLst>
-  </p:timing>
-</p:sld>
-</file>
-
-<file path=ppt/slides/slide13.xml><?xml version="1.0" encoding="utf-8"?>
-<p:sld xmlns:a="http://schemas.openxmlformats.org/drawingml/2006/main" xmlns:r="http://schemas.openxmlformats.org/officeDocument/2006/relationships" xmlns:p="http://schemas.openxmlformats.org/presentationml/2006/main">
-  <p:cSld>
-    <p:spTree>
-      <p:nvGrpSpPr>
-        <p:cNvPr id="1" name=""/>
-        <p:cNvGrpSpPr/>
-        <p:nvPr/>
-      </p:nvGrpSpPr>
-      <p:grpSpPr>
-        <a:xfrm>
-          <a:off x="0" y="0"/>
-          <a:ext cx="0" cy="0"/>
-          <a:chOff x="0" y="0"/>
-          <a:chExt cx="0" cy="0"/>
-        </a:xfrm>
-      </p:grpSpPr>
-      <p:sp>
-        <p:nvSpPr>
-          <p:cNvPr id="2" name="Title 1"/>
-          <p:cNvSpPr>
-            <a:spLocks noGrp="1"/>
-          </p:cNvSpPr>
-          <p:nvPr>
-            <p:ph type="title"/>
-          </p:nvPr>
-        </p:nvSpPr>
-        <p:spPr/>
-        <p:txBody>
-          <a:bodyPr/>
-          <a:lstStyle/>
-          <a:p>
-            <a:pPr lvl="0" indent="0" marL="0">
-              <a:buNone/>
-            </a:pPr>
-            <a:r>
-              <a:rPr/>
-              <a:t>Proyecto de datos VI</a:t>
-            </a:r>
-          </a:p>
-        </p:txBody>
-      </p:sp>
-      <p:sp>
-        <p:nvSpPr>
-          <p:cNvPr id="3" name="Content Placeholder 2"/>
-          <p:cNvSpPr>
-            <a:spLocks noGrp="1"/>
-          </p:cNvSpPr>
-          <p:nvPr>
-            <p:ph idx="1"/>
-          </p:nvPr>
-        </p:nvSpPr>
-        <p:spPr/>
-        <p:txBody>
-          <a:bodyPr/>
-          <a:lstStyle/>
-          <a:p>
-            <a:pPr lvl="0"/>
-            <a:r>
-              <a:rPr/>
-              <a:t>Pregunta → Datos → Algoritmos.</a:t>
-            </a:r>
-          </a:p>
-          <a:p>
-            <a:pPr lvl="0"/>
-            <a:r>
-              <a:rPr/>
-              <a:t>Tamaño de los datos (escalabilidad).</a:t>
-            </a:r>
-          </a:p>
-          <a:p>
-            <a:pPr lvl="0"/>
-            <a:r>
-              <a:rPr/>
-              <a:t>Fase de descubrimiento.</a:t>
-            </a:r>
-          </a:p>
-          <a:p>
-            <a:pPr lvl="0"/>
-            <a:r>
-              <a:rPr/>
-              <a:t>ETL.</a:t>
-            </a:r>
-          </a:p>
-          <a:p>
-            <a:pPr lvl="0"/>
-            <a:r>
-              <a:rPr/>
-              <a:t>Análisis con visualizaciones.</a:t>
-            </a:r>
-          </a:p>
-          <a:p>
-            <a:pPr lvl="0"/>
-            <a:r>
-              <a:rPr/>
-              <a:t>Fuentes externas de datos.</a:t>
-            </a:r>
-          </a:p>
-        </p:txBody>
-      </p:sp>
-    </p:spTree>
-  </p:cSld>
-  <p:timing>
-    <p:tnLst>
-      <p:par>
-        <p:cTn id="1" dur="indefinite" restart="never" nodeType="tmRoot">
-          <p:childTnLst>
-            <p:seq concurrent="1" nextAc="seek">
-              <p:cTn id="2" dur="indefinite" nodeType="mainSeq">
-                <p:childTnLst>
-                  <p:par>
-                    <p:cTn id="3" fill="hold">
-                      <p:stCondLst>
-                        <p:cond delay="indefinite"/>
-                      </p:stCondLst>
-                      <p:childTnLst>
-                        <p:par>
-                          <p:cTn id="4" fill="hold">
-                            <p:stCondLst>
-                              <p:cond delay="0"/>
-                            </p:stCondLst>
-                            <p:childTnLst>
-                              <p:par>
-                                <p:cTn id="5" presetID="1" presetClass="entr" presetSubtype="0" fill="hold" grpId="0" nodeType="clickEffect">
-                                  <p:stCondLst>
-                                    <p:cond delay="0"/>
-                                  </p:stCondLst>
-                                  <p:childTnLst>
-                                    <p:set>
-                                      <p:cBhvr>
-                                        <p:cTn id="6" dur="1" fill="hold">
-                                          <p:stCondLst>
-                                            <p:cond delay="0"/>
-                                          </p:stCondLst>
-                                        </p:cTn>
-                                        <p:tgtEl>
-                                          <p:spTgt spid="3">
-                                            <p:txEl>
-                                              <p:pRg st="0" end="0"/>
-                                            </p:txEl>
-                                          </p:spTgt>
-                                        </p:tgtEl>
-                                        <p:attrNameLst>
-                                          <p:attrName>style.visibility</p:attrName>
-                                        </p:attrNameLst>
-                                      </p:cBhvr>
-                                      <p:to>
-                                        <p:strVal val="visible"/>
-                                      </p:to>
-                                    </p:set>
-                                  </p:childTnLst>
-                                </p:cTn>
-                              </p:par>
-                            </p:childTnLst>
-                          </p:cTn>
-                        </p:par>
-                      </p:childTnLst>
-                    </p:cTn>
-                  </p:par>
-                  <p:par>
-                    <p:cTn id="7" fill="hold">
-                      <p:stCondLst>
-                        <p:cond delay="indefinite"/>
-                      </p:stCondLst>
-                      <p:childTnLst>
-                        <p:par>
-                          <p:cTn id="8" fill="hold">
-                            <p:stCondLst>
-                              <p:cond delay="0"/>
-                            </p:stCondLst>
-                            <p:childTnLst>
-                              <p:par>
-                                <p:cTn id="9" presetID="1" presetClass="entr" presetSubtype="0" fill="hold" grpId="0" nodeType="clickEffect">
-                                  <p:stCondLst>
-                                    <p:cond delay="0"/>
-                                  </p:stCondLst>
-                                  <p:childTnLst>
-                                    <p:set>
-                                      <p:cBhvr>
-                                        <p:cTn id="10" dur="1" fill="hold">
-                                          <p:stCondLst>
-                                            <p:cond delay="0"/>
-                                          </p:stCondLst>
-                                        </p:cTn>
-                                        <p:tgtEl>
-                                          <p:spTgt spid="3">
-                                            <p:txEl>
-                                              <p:pRg st="1" end="1"/>
-                                            </p:txEl>
-                                          </p:spTgt>
-                                        </p:tgtEl>
-                                        <p:attrNameLst>
-                                          <p:attrName>style.visibility</p:attrName>
-                                        </p:attrNameLst>
-                                      </p:cBhvr>
-                                      <p:to>
-                                        <p:strVal val="visible"/>
-                                      </p:to>
-                                    </p:set>
-                                  </p:childTnLst>
-                                </p:cTn>
-                              </p:par>
-                            </p:childTnLst>
-                          </p:cTn>
-                        </p:par>
-                      </p:childTnLst>
-                    </p:cTn>
-                  </p:par>
-                  <p:par>
-                    <p:cTn id="11" fill="hold">
-                      <p:stCondLst>
-                        <p:cond delay="indefinite"/>
-                      </p:stCondLst>
-                      <p:childTnLst>
-                        <p:par>
-                          <p:cTn id="12" fill="hold">
-                            <p:stCondLst>
-                              <p:cond delay="0"/>
-                            </p:stCondLst>
-                            <p:childTnLst>
-                              <p:par>
-                                <p:cTn id="13" presetID="1" presetClass="entr" presetSubtype="0" fill="hold" grpId="0" nodeType="clickEffect">
-                                  <p:stCondLst>
-                                    <p:cond delay="0"/>
-                                  </p:stCondLst>
-                                  <p:childTnLst>
-                                    <p:set>
-                                      <p:cBhvr>
-                                        <p:cTn id="14" dur="1" fill="hold">
-                                          <p:stCondLst>
-                                            <p:cond delay="0"/>
-                                          </p:stCondLst>
-                                        </p:cTn>
-                                        <p:tgtEl>
-                                          <p:spTgt spid="3">
-                                            <p:txEl>
-                                              <p:pRg st="2" end="2"/>
-                                            </p:txEl>
-                                          </p:spTgt>
-                                        </p:tgtEl>
-                                        <p:attrNameLst>
-                                          <p:attrName>style.visibility</p:attrName>
-                                        </p:attrNameLst>
-                                      </p:cBhvr>
-                                      <p:to>
-                                        <p:strVal val="visible"/>
-                                      </p:to>
-                                    </p:set>
-                                  </p:childTnLst>
-                                </p:cTn>
-                              </p:par>
-                            </p:childTnLst>
-                          </p:cTn>
-                        </p:par>
-                      </p:childTnLst>
-                    </p:cTn>
-                  </p:par>
-                  <p:par>
-                    <p:cTn id="15" fill="hold">
-                      <p:stCondLst>
-                        <p:cond delay="indefinite"/>
-                      </p:stCondLst>
-                      <p:childTnLst>
-                        <p:par>
-                          <p:cTn id="16" fill="hold">
-                            <p:stCondLst>
-                              <p:cond delay="0"/>
-                            </p:stCondLst>
-                            <p:childTnLst>
-                              <p:par>
-                                <p:cTn id="17" presetID="1" presetClass="entr" presetSubtype="0" fill="hold" grpId="0" nodeType="clickEffect">
-                                  <p:stCondLst>
-                                    <p:cond delay="0"/>
-                                  </p:stCondLst>
-                                  <p:childTnLst>
-                                    <p:set>
-                                      <p:cBhvr>
-                                        <p:cTn id="18" dur="1" fill="hold">
-                                          <p:stCondLst>
-                                            <p:cond delay="0"/>
-                                          </p:stCondLst>
-                                        </p:cTn>
-                                        <p:tgtEl>
-                                          <p:spTgt spid="3">
-                                            <p:txEl>
-                                              <p:pRg st="3" end="3"/>
-                                            </p:txEl>
-                                          </p:spTgt>
-                                        </p:tgtEl>
-                                        <p:attrNameLst>
-                                          <p:attrName>style.visibility</p:attrName>
-                                        </p:attrNameLst>
-                                      </p:cBhvr>
-                                      <p:to>
-                                        <p:strVal val="visible"/>
-                                      </p:to>
-                                    </p:set>
-                                  </p:childTnLst>
-                                </p:cTn>
-                              </p:par>
-                            </p:childTnLst>
-                          </p:cTn>
-                        </p:par>
-                      </p:childTnLst>
-                    </p:cTn>
-                  </p:par>
-                  <p:par>
-                    <p:cTn id="19" fill="hold">
-                      <p:stCondLst>
-                        <p:cond delay="indefinite"/>
-                      </p:stCondLst>
-                      <p:childTnLst>
-                        <p:par>
-                          <p:cTn id="20" fill="hold">
-                            <p:stCondLst>
-                              <p:cond delay="0"/>
-                            </p:stCondLst>
-                            <p:childTnLst>
-                              <p:par>
-                                <p:cTn id="21" presetID="1" presetClass="entr" presetSubtype="0" fill="hold" grpId="0" nodeType="clickEffect">
-                                  <p:stCondLst>
-                                    <p:cond delay="0"/>
-                                  </p:stCondLst>
-                                  <p:childTnLst>
-                                    <p:set>
-                                      <p:cBhvr>
-                                        <p:cTn id="22" dur="1" fill="hold">
-                                          <p:stCondLst>
-                                            <p:cond delay="0"/>
-                                          </p:stCondLst>
-                                        </p:cTn>
-                                        <p:tgtEl>
-                                          <p:spTgt spid="3">
-                                            <p:txEl>
-                                              <p:pRg st="4" end="4"/>
-                                            </p:txEl>
-                                          </p:spTgt>
-                                        </p:tgtEl>
-                                        <p:attrNameLst>
-                                          <p:attrName>style.visibility</p:attrName>
-                                        </p:attrNameLst>
-                                      </p:cBhvr>
-                                      <p:to>
-                                        <p:strVal val="visible"/>
-                                      </p:to>
-                                    </p:set>
-                                  </p:childTnLst>
-                                </p:cTn>
-                              </p:par>
-                            </p:childTnLst>
-                          </p:cTn>
-                        </p:par>
-                      </p:childTnLst>
-                    </p:cTn>
-                  </p:par>
-                  <p:par>
-                    <p:cTn id="23" fill="hold">
-                      <p:stCondLst>
-                        <p:cond delay="indefinite"/>
-                      </p:stCondLst>
-                      <p:childTnLst>
-                        <p:par>
-                          <p:cTn id="24" fill="hold">
-                            <p:stCondLst>
-                              <p:cond delay="0"/>
-                            </p:stCondLst>
-                            <p:childTnLst>
-                              <p:par>
-                                <p:cTn id="25" presetID="1" presetClass="entr" presetSubtype="0" fill="hold" grpId="0" nodeType="clickEffect">
-                                  <p:stCondLst>
-                                    <p:cond delay="0"/>
-                                  </p:stCondLst>
-                                  <p:childTnLst>
-                                    <p:set>
-                                      <p:cBhvr>
-                                        <p:cTn id="26" dur="1" fill="hold">
-                                          <p:stCondLst>
-                                            <p:cond delay="0"/>
-                                          </p:stCondLst>
-                                        </p:cTn>
-                                        <p:tgtEl>
-                                          <p:spTgt spid="3">
-                                            <p:txEl>
-                                              <p:pRg st="5" end="5"/>
-                                            </p:txEl>
-                                          </p:spTgt>
-                                        </p:tgtEl>
-                                        <p:attrNameLst>
-                                          <p:attrName>style.visibility</p:attrName>
-                                        </p:attrNameLst>
-                                      </p:cBhvr>
-                                      <p:to>
-                                        <p:strVal val="visible"/>
-                                      </p:to>
-                                    </p:set>
-                                  </p:childTnLst>
-                                </p:cTn>
-                              </p:par>
-                            </p:childTnLst>
-                          </p:cTn>
-                        </p:par>
-                      </p:childTnLst>
-                    </p:cTn>
-                  </p:par>
-                </p:childTnLst>
-              </p:cTn>
-              <p:prevCondLst>
-                <p:cond evt="onPrev" delay="0">
-                  <p:tgtEl>
-                    <p:sldTgt/>
-                  </p:tgtEl>
-                </p:cond>
-              </p:prevCondLst>
-              <p:nextCondLst>
-                <p:cond evt="onNext" delay="0">
-                  <p:tgtEl>
-                    <p:sldTgt/>
-                  </p:tgtEl>
-                </p:cond>
-              </p:nextCondLst>
-            </p:seq>
-          </p:childTnLst>
-        </p:cTn>
-      </p:par>
-    </p:tnLst>
-    <p:bldLst>
-      <p:bldP spid="3" grpId="0" uiExpand="1" build="p"/>
-    </p:bldLst>
-  </p:timing>
-</p:sld>
-</file>
-
-<file path=ppt/slides/slide14.xml><?xml version="1.0" encoding="utf-8"?>
-<p:sld xmlns:a="http://schemas.openxmlformats.org/drawingml/2006/main" xmlns:r="http://schemas.openxmlformats.org/officeDocument/2006/relationships" xmlns:p="http://schemas.openxmlformats.org/presentationml/2006/main">
-  <p:cSld>
-    <p:spTree>
-      <p:nvGrpSpPr>
-        <p:cNvPr id="1" name=""/>
-        <p:cNvGrpSpPr/>
-        <p:nvPr/>
-      </p:nvGrpSpPr>
-      <p:grpSpPr>
-        <a:xfrm>
-          <a:off x="0" y="0"/>
-          <a:ext cx="0" cy="0"/>
-          <a:chOff x="0" y="0"/>
-          <a:chExt cx="0" cy="0"/>
-        </a:xfrm>
-      </p:grpSpPr>
-      <p:sp>
-        <p:nvSpPr>
-          <p:cNvPr id="2" name="Title 1"/>
-          <p:cNvSpPr>
-            <a:spLocks noGrp="1"/>
-          </p:cNvSpPr>
-          <p:nvPr>
-            <p:ph type="title"/>
-          </p:nvPr>
-        </p:nvSpPr>
-        <p:spPr/>
-        <p:txBody>
-          <a:bodyPr/>
-          <a:lstStyle/>
-          <a:p>
-            <a:pPr lvl="0" indent="0" marL="0">
-              <a:buNone/>
-            </a:pPr>
-            <a:r>
-              <a:rPr/>
-              <a:t>Proyecto de datos VII</a:t>
-            </a:r>
-          </a:p>
-        </p:txBody>
-      </p:sp>
-      <p:sp>
-        <p:nvSpPr>
-          <p:cNvPr id="3" name="Content Placeholder 2"/>
-          <p:cNvSpPr>
-            <a:spLocks noGrp="1"/>
-          </p:cNvSpPr>
-          <p:nvPr>
-            <p:ph idx="1"/>
-          </p:nvPr>
-        </p:nvSpPr>
-        <p:spPr/>
-        <p:txBody>
-          <a:bodyPr/>
-          <a:lstStyle/>
-          <a:p>
-            <a:pPr lvl="0"/>
-            <a:r>
-              <a:rPr/>
-              <a:t>Licencias de uso (</a:t>
+              <a:t>Santiago Mota </a:t>
             </a:r>
             <a:r>
               <a:rPr>
                 <a:hlinkClick r:id="rId2"/>
               </a:rPr>
-              <a:t>link</a:t>
-            </a:r>
-            <a:r>
-              <a:rPr/>
-              <a:t>).</a:t>
-            </a:r>
-          </a:p>
-          <a:p>
-            <a:pPr lvl="0"/>
-            <a:r>
-              <a:rPr/>
-              <a:t>De los datos.</a:t>
-            </a:r>
-          </a:p>
-          <a:p>
-            <a:pPr lvl="0"/>
-            <a:r>
-              <a:rPr/>
-              <a:t>Mucho cuidado con los datos de empresa.</a:t>
-            </a:r>
-          </a:p>
-          <a:p>
-            <a:pPr lvl="0"/>
-            <a:r>
-              <a:rPr/>
-              <a:t>Licencias del código.</a:t>
-            </a:r>
-          </a:p>
-          <a:p>
-            <a:pPr lvl="0"/>
-            <a:r>
-              <a:rPr/>
-              <a:t>El mundo académico es algo mas laxo.</a:t>
+              <a:t>LinkedIn</a:t>
             </a:r>
           </a:p>
           <a:p>
@@ -4835,536 +3567,68 @@
               <a:rPr>
                 <a:hlinkClick r:id="rId3"/>
               </a:rPr>
-              <a:t>¿Webscrapping en el INE?</a:t>
-            </a:r>
-          </a:p>
-        </p:txBody>
-      </p:sp>
-    </p:spTree>
-  </p:cSld>
-</p:sld>
-</file>
-
-<file path=ppt/slides/slide15.xml><?xml version="1.0" encoding="utf-8"?>
-<p:sld xmlns:a="http://schemas.openxmlformats.org/drawingml/2006/main" xmlns:r="http://schemas.openxmlformats.org/officeDocument/2006/relationships" xmlns:p="http://schemas.openxmlformats.org/presentationml/2006/main">
-  <p:cSld>
-    <p:spTree>
-      <p:nvGrpSpPr>
-        <p:cNvPr id="1" name=""/>
-        <p:cNvGrpSpPr/>
-        <p:nvPr/>
-      </p:nvGrpSpPr>
-      <p:grpSpPr>
-        <a:xfrm>
-          <a:off x="0" y="0"/>
-          <a:ext cx="0" cy="0"/>
-          <a:chOff x="0" y="0"/>
-          <a:chExt cx="0" cy="0"/>
-        </a:xfrm>
-      </p:grpSpPr>
-      <p:sp>
-        <p:nvSpPr>
-          <p:cNvPr id="2" name="Title 1"/>
-          <p:cNvSpPr>
-            <a:spLocks noGrp="1"/>
-          </p:cNvSpPr>
-          <p:nvPr>
-            <p:ph type="title"/>
-          </p:nvPr>
-        </p:nvSpPr>
-        <p:spPr/>
-        <p:txBody>
-          <a:bodyPr/>
-          <a:lstStyle/>
-          <a:p>
-            <a:pPr lvl="0" indent="0" marL="0">
-              <a:buNone/>
-            </a:pPr>
-            <a:r>
-              <a:rPr/>
-              <a:t>Proyecto de datos VIII</a:t>
-            </a:r>
-          </a:p>
-        </p:txBody>
-      </p:sp>
-      <p:sp>
-        <p:nvSpPr>
-          <p:cNvPr id="3" name="Content Placeholder 2"/>
-          <p:cNvSpPr>
-            <a:spLocks noGrp="1"/>
-          </p:cNvSpPr>
-          <p:nvPr>
-            <p:ph idx="1"/>
-          </p:nvPr>
-        </p:nvSpPr>
-        <p:spPr/>
-        <p:txBody>
-          <a:bodyPr/>
-          <a:lstStyle/>
+              <a:t>santiago_mota@yahoo.es</a:t>
+            </a:r>
+          </a:p>
           <a:p>
             <a:pPr lvl="0"/>
-            <a:r>
-              <a:rPr/>
-              <a:t>Trabajos / papers del dominio.</a:t>
-            </a:r>
-          </a:p>
-          <a:p>
-            <a:pPr lvl="0"/>
-            <a:r>
-              <a:rPr/>
-              <a:t>Algoritmos (GBM, Xgboost, Redes neuronales).</a:t>
-            </a:r>
-          </a:p>
-          <a:p>
-            <a:pPr lvl="0"/>
-            <a:r>
-              <a:rPr/>
-              <a:t>Presentación de resultados.</a:t>
-            </a:r>
-          </a:p>
-          <a:p>
-            <a:pPr lvl="0"/>
-            <a:r>
-              <a:rPr/>
-              <a:t>¿CÓMO TRASLADAR AL NEGOCIO?</a:t>
-            </a:r>
-          </a:p>
-        </p:txBody>
-      </p:sp>
-    </p:spTree>
-  </p:cSld>
-</p:sld>
-</file>
-
-<file path=ppt/slides/slide16.xml><?xml version="1.0" encoding="utf-8"?>
-<p:sld xmlns:a="http://schemas.openxmlformats.org/drawingml/2006/main" xmlns:r="http://schemas.openxmlformats.org/officeDocument/2006/relationships" xmlns:p="http://schemas.openxmlformats.org/presentationml/2006/main">
-  <p:cSld>
-    <p:spTree>
-      <p:nvGrpSpPr>
-        <p:cNvPr id="1" name=""/>
-        <p:cNvGrpSpPr/>
-        <p:nvPr/>
-      </p:nvGrpSpPr>
-      <p:grpSpPr>
-        <a:xfrm>
-          <a:off x="0" y="0"/>
-          <a:ext cx="0" cy="0"/>
-          <a:chOff x="0" y="0"/>
-          <a:chExt cx="0" cy="0"/>
-        </a:xfrm>
-      </p:grpSpPr>
-      <p:sp>
-        <p:nvSpPr>
-          <p:cNvPr id="2" name="Title 1"/>
-          <p:cNvSpPr>
-            <a:spLocks noGrp="1"/>
-          </p:cNvSpPr>
-          <p:nvPr>
-            <p:ph type="title"/>
-          </p:nvPr>
-        </p:nvSpPr>
-        <p:spPr/>
-        <p:txBody>
-          <a:bodyPr/>
-          <a:lstStyle/>
-          <a:p>
-            <a:pPr lvl="0" indent="0" marL="0">
-              <a:buNone/>
-            </a:pPr>
-            <a:r>
-              <a:rPr/>
-              <a:t>Mi proyecto en 2012</a:t>
-            </a:r>
-          </a:p>
-        </p:txBody>
-      </p:sp>
-      <p:sp>
-        <p:nvSpPr>
-          <p:cNvPr id="3" name="Content Placeholder 2"/>
-          <p:cNvSpPr>
-            <a:spLocks noGrp="1"/>
-          </p:cNvSpPr>
-          <p:nvPr>
-            <p:ph idx="1"/>
-          </p:nvPr>
-        </p:nvSpPr>
-        <p:spPr/>
-        <p:txBody>
-          <a:bodyPr/>
-          <a:lstStyle/>
-          <a:p>
-            <a:pPr lvl="0"/>
-            <a:r>
-              <a:rPr/>
-              <a:t>Cómo nace y cómo cambia. ¿Por qué cambia?</a:t>
-            </a:r>
-          </a:p>
-          <a:p>
-            <a:pPr lvl="0"/>
-            <a:r>
-              <a:rPr>
-                <a:hlinkClick r:id="rId2"/>
-              </a:rPr>
-              <a:t>Carta de presentación</a:t>
-            </a:r>
-            <a:r>
-              <a:rPr/>
-              <a:t>.</a:t>
-            </a:r>
-          </a:p>
-          <a:p>
-            <a:pPr lvl="0"/>
-            <a:r>
-              <a:rPr>
-                <a:hlinkClick r:id="rId3"/>
-              </a:rPr>
-              <a:t>Resumen ejecutivo</a:t>
-            </a:r>
-            <a:r>
-              <a:rPr/>
-              <a:t>.</a:t>
-            </a:r>
-          </a:p>
-          <a:p>
-            <a:pPr lvl="0"/>
-            <a:r>
-              <a:rPr/>
-              <a:t>Sale todo el mundo a presentar.</a:t>
-            </a:r>
-          </a:p>
-          <a:p>
-            <a:pPr lvl="0"/>
-            <a:r>
-              <a:rPr/>
-              <a:t>Ficheros. ¿</a:t>
-            </a:r>
             <a:r>
               <a:rPr>
                 <a:hlinkClick r:id="rId4"/>
               </a:rPr>
-              <a:t>Vídeo</a:t>
-            </a:r>
-            <a:r>
-              <a:rPr/>
-              <a:t>?</a:t>
-            </a:r>
-          </a:p>
-        </p:txBody>
-      </p:sp>
-    </p:spTree>
-  </p:cSld>
-</p:sld>
-</file>
-
-<file path=ppt/slides/slide17.xml><?xml version="1.0" encoding="utf-8"?>
-<p:sld xmlns:a="http://schemas.openxmlformats.org/drawingml/2006/main" xmlns:r="http://schemas.openxmlformats.org/officeDocument/2006/relationships" xmlns:p="http://schemas.openxmlformats.org/presentationml/2006/main">
-  <p:cSld>
-    <p:spTree>
-      <p:nvGrpSpPr>
-        <p:cNvPr id="1" name=""/>
-        <p:cNvGrpSpPr/>
-        <p:nvPr/>
-      </p:nvGrpSpPr>
-      <p:grpSpPr>
-        <a:xfrm>
-          <a:off x="0" y="0"/>
-          <a:ext cx="0" cy="0"/>
-          <a:chOff x="0" y="0"/>
-          <a:chExt cx="0" cy="0"/>
-        </a:xfrm>
-      </p:grpSpPr>
-      <p:sp>
-        <p:nvSpPr>
-          <p:cNvPr id="2" name="Title 1"/>
-          <p:cNvSpPr>
-            <a:spLocks noGrp="1"/>
-          </p:cNvSpPr>
-          <p:nvPr>
-            <p:ph type="title"/>
-          </p:nvPr>
-        </p:nvSpPr>
-        <p:spPr/>
-        <p:txBody>
-          <a:bodyPr/>
-          <a:lstStyle/>
-          <a:p>
-            <a:pPr lvl="0" indent="0" marL="0">
-              <a:buNone/>
-            </a:pPr>
-            <a:r>
-              <a:rPr/>
-              <a:t>Durante el TFM I</a:t>
-            </a:r>
-          </a:p>
-        </p:txBody>
-      </p:sp>
-      <p:sp>
-        <p:nvSpPr>
-          <p:cNvPr id="3" name="Content Placeholder 2"/>
-          <p:cNvSpPr>
-            <a:spLocks noGrp="1"/>
-          </p:cNvSpPr>
-          <p:nvPr>
-            <p:ph idx="1"/>
-          </p:nvPr>
-        </p:nvSpPr>
-        <p:spPr/>
-        <p:txBody>
-          <a:bodyPr/>
-          <a:lstStyle/>
+              <a:t>Github Santiago Mota</a:t>
+            </a:r>
+          </a:p>
           <a:p>
             <a:pPr lvl="0"/>
             <a:r>
-              <a:rPr/>
-              <a:t>Elegir un proyecto que os guste.</a:t>
+              <a:rPr>
+                <a:hlinkClick r:id="rId5"/>
+              </a:rPr>
+              <a:t>Esta presentación online</a:t>
             </a:r>
           </a:p>
           <a:p>
             <a:pPr lvl="0"/>
             <a:r>
-              <a:rPr/>
-              <a:t>¿Dónde podemos encontrar fuentes de datos? </a:t>
-            </a:r>
-            <a:r>
               <a:rPr>
-                <a:hlinkClick r:id="rId2"/>
-              </a:rPr>
-              <a:t>repo Open data</a:t>
-            </a:r>
-            <a:r>
-              <a:rPr/>
-              <a:t>.</a:t>
-            </a:r>
-          </a:p>
-          <a:p>
-            <a:pPr lvl="0"/>
-            <a:r>
-              <a:rPr/>
-              <a:t>Análisis previo del proyecto (Post en el foro).</a:t>
-            </a:r>
-          </a:p>
-          <a:p>
-            <a:pPr lvl="0"/>
-            <a:r>
-              <a:rPr/>
-              <a:t>El TFM va evolucionando y es normal, si no hay cambios significativos, no hace falta comunicarlo.</a:t>
-            </a:r>
-          </a:p>
-          <a:p>
-            <a:pPr lvl="0"/>
-            <a:r>
-              <a:rPr/>
-              <a:t>La autoría del TFM es vuestra.</a:t>
-            </a:r>
-          </a:p>
-        </p:txBody>
-      </p:sp>
-    </p:spTree>
-  </p:cSld>
-</p:sld>
-</file>
-
-<file path=ppt/slides/slide18.xml><?xml version="1.0" encoding="utf-8"?>
-<p:sld xmlns:a="http://schemas.openxmlformats.org/drawingml/2006/main" xmlns:r="http://schemas.openxmlformats.org/officeDocument/2006/relationships" xmlns:p="http://schemas.openxmlformats.org/presentationml/2006/main">
-  <p:cSld>
-    <p:spTree>
-      <p:nvGrpSpPr>
-        <p:cNvPr id="1" name=""/>
-        <p:cNvGrpSpPr/>
-        <p:nvPr/>
-      </p:nvGrpSpPr>
-      <p:grpSpPr>
-        <a:xfrm>
-          <a:off x="0" y="0"/>
-          <a:ext cx="0" cy="0"/>
-          <a:chOff x="0" y="0"/>
-          <a:chExt cx="0" cy="0"/>
-        </a:xfrm>
-      </p:grpSpPr>
-      <p:sp>
-        <p:nvSpPr>
-          <p:cNvPr id="2" name="Title 1"/>
-          <p:cNvSpPr>
-            <a:spLocks noGrp="1"/>
-          </p:cNvSpPr>
-          <p:nvPr>
-            <p:ph type="title"/>
-          </p:nvPr>
-        </p:nvSpPr>
-        <p:spPr/>
-        <p:txBody>
-          <a:bodyPr/>
-          <a:lstStyle/>
-          <a:p>
-            <a:pPr lvl="0" indent="0" marL="0">
-              <a:buNone/>
-            </a:pPr>
-            <a:r>
-              <a:rPr/>
-              <a:t>Durante el TFM II</a:t>
-            </a:r>
-          </a:p>
-        </p:txBody>
-      </p:sp>
-      <p:sp>
-        <p:nvSpPr>
-          <p:cNvPr id="3" name="Content Placeholder 2"/>
-          <p:cNvSpPr>
-            <a:spLocks noGrp="1"/>
-          </p:cNvSpPr>
-          <p:nvPr>
-            <p:ph idx="1"/>
-          </p:nvPr>
-        </p:nvSpPr>
-        <p:spPr/>
-        <p:txBody>
-          <a:bodyPr/>
-          <a:lstStyle/>
-          <a:p>
-            <a:pPr lvl="0"/>
-            <a:r>
-              <a:rPr/>
-              <a:t>¿Hay alguna plantilla?</a:t>
-            </a:r>
-          </a:p>
-          <a:p>
-            <a:pPr lvl="0"/>
-            <a:r>
-              <a:rPr/>
-              <a:t>Planificación del tiempo.</a:t>
-            </a:r>
-          </a:p>
-          <a:p>
-            <a:pPr lvl="0"/>
-            <a:r>
-              <a:rPr/>
-              <a:t>Enfoque iterativo.</a:t>
-            </a:r>
-          </a:p>
-          <a:p>
-            <a:pPr lvl="0"/>
-            <a:r>
-              <a:rPr/>
-              <a:t>NO es un ejercicio de una clase.</a:t>
-            </a:r>
-          </a:p>
-          <a:p>
-            <a:pPr lvl="0"/>
-            <a:r>
-              <a:rPr/>
-              <a:t>Agosto/Navidades.</a:t>
-            </a:r>
-          </a:p>
-        </p:txBody>
-      </p:sp>
-    </p:spTree>
-  </p:cSld>
-</p:sld>
-</file>
-
-<file path=ppt/slides/slide19.xml><?xml version="1.0" encoding="utf-8"?>
-<p:sld xmlns:a="http://schemas.openxmlformats.org/drawingml/2006/main" xmlns:r="http://schemas.openxmlformats.org/officeDocument/2006/relationships" xmlns:p="http://schemas.openxmlformats.org/presentationml/2006/main">
-  <p:cSld>
-    <p:spTree>
-      <p:nvGrpSpPr>
-        <p:cNvPr id="1" name=""/>
-        <p:cNvGrpSpPr/>
-        <p:nvPr/>
-      </p:nvGrpSpPr>
-      <p:grpSpPr>
-        <a:xfrm>
-          <a:off x="0" y="0"/>
-          <a:ext cx="0" cy="0"/>
-          <a:chOff x="0" y="0"/>
-          <a:chExt cx="0" cy="0"/>
-        </a:xfrm>
-      </p:grpSpPr>
-      <p:sp>
-        <p:nvSpPr>
-          <p:cNvPr id="2" name="Title 1"/>
-          <p:cNvSpPr>
-            <a:spLocks noGrp="1"/>
-          </p:cNvSpPr>
-          <p:nvPr>
-            <p:ph type="title"/>
-          </p:nvPr>
-        </p:nvSpPr>
-        <p:spPr/>
-        <p:txBody>
-          <a:bodyPr/>
-          <a:lstStyle/>
-          <a:p>
-            <a:pPr lvl="0" indent="0" marL="0">
-              <a:buNone/>
-            </a:pPr>
-            <a:r>
-              <a:rPr/>
-              <a:t>Durante el TFM III</a:t>
-            </a:r>
-          </a:p>
-        </p:txBody>
-      </p:sp>
-      <p:sp>
-        <p:nvSpPr>
-          <p:cNvPr id="3" name="Content Placeholder 2"/>
-          <p:cNvSpPr>
-            <a:spLocks noGrp="1"/>
-          </p:cNvSpPr>
-          <p:nvPr>
-            <p:ph idx="1"/>
-          </p:nvPr>
-        </p:nvSpPr>
-        <p:spPr/>
-        <p:txBody>
-          <a:bodyPr/>
-          <a:lstStyle/>
-          <a:p>
-            <a:pPr lvl="0"/>
-            <a:r>
-              <a:rPr/>
-              <a:t>Ojo con los datos sintéticos.</a:t>
-            </a:r>
-          </a:p>
-          <a:p>
-            <a:pPr lvl="0"/>
-            <a:r>
-              <a:rPr/>
-              <a:t>No dejar la entrega para el último día.</a:t>
-            </a:r>
-          </a:p>
-          <a:p>
-            <a:pPr lvl="0"/>
-            <a:r>
-              <a:rPr/>
-              <a:t>El uso de plataformas cerradas puede hacer que no se tenga acceso externo a los datos.</a:t>
-            </a:r>
-          </a:p>
-          <a:p>
-            <a:pPr lvl="0"/>
-            <a:r>
-              <a:rPr/>
-              <a:t>¿Hay una aplicación web?</a:t>
-            </a:r>
-          </a:p>
-          <a:p>
-            <a:pPr lvl="0"/>
-            <a:r>
-              <a:rPr/>
-              <a:t>¿El código se ejecuta haciendo </a:t>
-            </a:r>
-            <a:r>
-              <a:rPr>
-                <a:latin typeface="Courier"/>
-              </a:rPr>
-              <a:t>RUN</a:t>
-            </a:r>
-            <a:r>
-              <a:rPr/>
-              <a:t>?</a:t>
-            </a:r>
-          </a:p>
-        </p:txBody>
-      </p:sp>
+                <a:hlinkClick r:id="rId6"/>
+              </a:rPr>
+              <a:t>Repositorio Github de esta presentación</a:t>
+            </a:r>
+          </a:p>
+        </p:txBody>
+      </p:sp>
+      <p:pic>
+        <p:nvPicPr>
+          <p:cNvPr descr="./figs/Concurso_presentacion_Github.svg" id="0" name="Picture 1"/>
+          <p:cNvPicPr>
+            <a:picLocks noGrp="1" noChangeAspect="1"/>
+          </p:cNvPicPr>
+          <p:nvPr/>
+        </p:nvPicPr>
+        <p:blipFill>
+          <a:blip r:embed="rId7"/>
+          <a:stretch>
+            <a:fillRect/>
+          </a:stretch>
+        </p:blipFill>
+        <p:spPr bwMode="auto">
+          <a:xfrm>
+            <a:off x="3568700" y="635000"/>
+            <a:ext cx="5105400" cy="5105400"/>
+          </a:xfrm>
+          <a:prstGeom prst="rect">
+            <a:avLst/>
+          </a:prstGeom>
+          <a:noFill/>
+          <a:ln w="9525">
+            <a:noFill/>
+            <a:headEnd/>
+            <a:tailEnd/>
+          </a:ln>
+        </p:spPr>
+      </p:pic>
     </p:spTree>
   </p:cSld>
 </p:sld>
@@ -5829,1007 +4093,6 @@
 </p:sld>
 </file>
 
-<file path=ppt/slides/slide20.xml><?xml version="1.0" encoding="utf-8"?>
-<p:sld xmlns:a="http://schemas.openxmlformats.org/drawingml/2006/main" xmlns:r="http://schemas.openxmlformats.org/officeDocument/2006/relationships" xmlns:p="http://schemas.openxmlformats.org/presentationml/2006/main">
-  <p:cSld>
-    <p:spTree>
-      <p:nvGrpSpPr>
-        <p:cNvPr id="1" name=""/>
-        <p:cNvGrpSpPr/>
-        <p:nvPr/>
-      </p:nvGrpSpPr>
-      <p:grpSpPr>
-        <a:xfrm>
-          <a:off x="0" y="0"/>
-          <a:ext cx="0" cy="0"/>
-          <a:chOff x="0" y="0"/>
-          <a:chExt cx="0" cy="0"/>
-        </a:xfrm>
-      </p:grpSpPr>
-      <p:sp>
-        <p:nvSpPr>
-          <p:cNvPr id="2" name="Title 1"/>
-          <p:cNvSpPr>
-            <a:spLocks noGrp="1"/>
-          </p:cNvSpPr>
-          <p:nvPr>
-            <p:ph type="title"/>
-          </p:nvPr>
-        </p:nvSpPr>
-        <p:spPr/>
-        <p:txBody>
-          <a:bodyPr/>
-          <a:lstStyle/>
-          <a:p>
-            <a:pPr lvl="0" indent="0" marL="0">
-              <a:buNone/>
-            </a:pPr>
-            <a:r>
-              <a:rPr/>
-              <a:t>Durante el TFM IV</a:t>
-            </a:r>
-          </a:p>
-        </p:txBody>
-      </p:sp>
-      <p:sp>
-        <p:nvSpPr>
-          <p:cNvPr id="3" name="Content Placeholder 2"/>
-          <p:cNvSpPr>
-            <a:spLocks noGrp="1"/>
-          </p:cNvSpPr>
-          <p:nvPr>
-            <p:ph idx="1"/>
-          </p:nvPr>
-        </p:nvSpPr>
-        <p:spPr/>
-        <p:txBody>
-          <a:bodyPr/>
-          <a:lstStyle/>
-          <a:p>
-            <a:pPr lvl="0"/>
-            <a:r>
-              <a:rPr/>
-              <a:t>Directorios (referencias indirectas).</a:t>
-            </a:r>
-          </a:p>
-          <a:p>
-            <a:pPr lvl="0"/>
-            <a:r>
-              <a:rPr/>
-              <a:t>No tiene sentido acelerar el vídeo.</a:t>
-            </a:r>
-          </a:p>
-          <a:p>
-            <a:pPr lvl="0"/>
-            <a:r>
-              <a:rPr/>
-              <a:t>Qué voy a incluir en los anexos.</a:t>
-            </a:r>
-          </a:p>
-          <a:p>
-            <a:pPr lvl="0"/>
-            <a:r>
-              <a:rPr/>
-              <a:t>¿Es un API de verdad o tres bloques de código levantándola?</a:t>
-            </a:r>
-          </a:p>
-          <a:p>
-            <a:pPr lvl="0"/>
-            <a:r>
-              <a:rPr/>
-              <a:t>Google Colab. Ventajas (facilidad) / Desventajas (salir del entorno).</a:t>
-            </a:r>
-          </a:p>
-        </p:txBody>
-      </p:sp>
-    </p:spTree>
-  </p:cSld>
-</p:sld>
-</file>
-
-<file path=ppt/slides/slide21.xml><?xml version="1.0" encoding="utf-8"?>
-<p:sld xmlns:a="http://schemas.openxmlformats.org/drawingml/2006/main" xmlns:r="http://schemas.openxmlformats.org/officeDocument/2006/relationships" xmlns:p="http://schemas.openxmlformats.org/presentationml/2006/main">
-  <p:cSld>
-    <p:spTree>
-      <p:nvGrpSpPr>
-        <p:cNvPr id="1" name=""/>
-        <p:cNvGrpSpPr/>
-        <p:nvPr/>
-      </p:nvGrpSpPr>
-      <p:grpSpPr>
-        <a:xfrm>
-          <a:off x="0" y="0"/>
-          <a:ext cx="0" cy="0"/>
-          <a:chOff x="0" y="0"/>
-          <a:chExt cx="0" cy="0"/>
-        </a:xfrm>
-      </p:grpSpPr>
-      <p:sp>
-        <p:nvSpPr>
-          <p:cNvPr id="2" name="Title 1"/>
-          <p:cNvSpPr>
-            <a:spLocks noGrp="1"/>
-          </p:cNvSpPr>
-          <p:nvPr>
-            <p:ph type="title"/>
-          </p:nvPr>
-        </p:nvSpPr>
-        <p:spPr/>
-        <p:txBody>
-          <a:bodyPr/>
-          <a:lstStyle/>
-          <a:p>
-            <a:pPr lvl="0" indent="0" marL="0">
-              <a:buNone/>
-            </a:pPr>
-            <a:r>
-              <a:rPr/>
-              <a:t>Durante el TFM V</a:t>
-            </a:r>
-          </a:p>
-        </p:txBody>
-      </p:sp>
-      <p:sp>
-        <p:nvSpPr>
-          <p:cNvPr id="3" name="Content Placeholder 2"/>
-          <p:cNvSpPr>
-            <a:spLocks noGrp="1"/>
-          </p:cNvSpPr>
-          <p:nvPr>
-            <p:ph idx="1"/>
-          </p:nvPr>
-        </p:nvSpPr>
-        <p:spPr/>
-        <p:txBody>
-          <a:bodyPr/>
-          <a:lstStyle/>
-          <a:p>
-            <a:pPr lvl="0"/>
-            <a:r>
-              <a:rPr/>
-              <a:t>Si procede. ¿Mejoramos la parte estética del notebook? Markdown / </a:t>
-            </a:r>
-            <a:r>
-              <a:rPr>
-                <a:hlinkClick r:id="rId2"/>
-              </a:rPr>
-              <a:t>Quarto</a:t>
-            </a:r>
-            <a:r>
-              <a:rPr/>
-              <a:t>.</a:t>
-            </a:r>
-          </a:p>
-          <a:p>
-            <a:pPr lvl="0"/>
-            <a:r>
-              <a:rPr/>
-              <a:t>No hace falta incluir teoría, ni estado del arte (no es un paper).</a:t>
-            </a:r>
-          </a:p>
-          <a:p>
-            <a:pPr lvl="0"/>
-            <a:r>
-              <a:rPr/>
-              <a:t>Los vídeos sin soporte pierden mucho.</a:t>
-            </a:r>
-          </a:p>
-          <a:p>
-            <a:pPr lvl="0"/>
-            <a:r>
-              <a:rPr/>
-              <a:t>Vídeos en formato vertical.</a:t>
-            </a:r>
-          </a:p>
-          <a:p>
-            <a:pPr lvl="0"/>
-            <a:r>
-              <a:rPr/>
-              <a:t>Las tres opciones y el por qué (no tienen trascendencia).</a:t>
-            </a:r>
-          </a:p>
-        </p:txBody>
-      </p:sp>
-    </p:spTree>
-  </p:cSld>
-</p:sld>
-</file>
-
-<file path=ppt/slides/slide22.xml><?xml version="1.0" encoding="utf-8"?>
-<p:sld xmlns:a="http://schemas.openxmlformats.org/drawingml/2006/main" xmlns:r="http://schemas.openxmlformats.org/officeDocument/2006/relationships" xmlns:p="http://schemas.openxmlformats.org/presentationml/2006/main">
-  <p:cSld>
-    <p:spTree>
-      <p:nvGrpSpPr>
-        <p:cNvPr id="1" name=""/>
-        <p:cNvGrpSpPr/>
-        <p:nvPr/>
-      </p:nvGrpSpPr>
-      <p:grpSpPr>
-        <a:xfrm>
-          <a:off x="0" y="0"/>
-          <a:ext cx="0" cy="0"/>
-          <a:chOff x="0" y="0"/>
-          <a:chExt cx="0" cy="0"/>
-        </a:xfrm>
-      </p:grpSpPr>
-      <p:sp>
-        <p:nvSpPr>
-          <p:cNvPr id="2" name="Title 1"/>
-          <p:cNvSpPr>
-            <a:spLocks noGrp="1"/>
-          </p:cNvSpPr>
-          <p:nvPr>
-            <p:ph type="title"/>
-          </p:nvPr>
-        </p:nvSpPr>
-        <p:spPr/>
-        <p:txBody>
-          <a:bodyPr/>
-          <a:lstStyle/>
-          <a:p>
-            <a:pPr lvl="0" indent="0" marL="0">
-              <a:buNone/>
-            </a:pPr>
-            <a:r>
-              <a:rPr/>
-              <a:t>Conclusiones</a:t>
-            </a:r>
-          </a:p>
-        </p:txBody>
-      </p:sp>
-      <p:sp>
-        <p:nvSpPr>
-          <p:cNvPr id="3" name="Content Placeholder 2"/>
-          <p:cNvSpPr>
-            <a:spLocks noGrp="1"/>
-          </p:cNvSpPr>
-          <p:nvPr>
-            <p:ph idx="1"/>
-          </p:nvPr>
-        </p:nvSpPr>
-        <p:spPr/>
-        <p:txBody>
-          <a:bodyPr/>
-          <a:lstStyle/>
-          <a:p>
-            <a:pPr lvl="0"/>
-            <a:r>
-              <a:rPr/>
-              <a:t>Lenguaje rimbombante.</a:t>
-            </a:r>
-          </a:p>
-          <a:p>
-            <a:pPr lvl="0"/>
-            <a:r>
-              <a:rPr/>
-              <a:t>“Se ha conseguido…”</a:t>
-            </a:r>
-          </a:p>
-          <a:p>
-            <a:pPr lvl="0"/>
-            <a:r>
-              <a:rPr/>
-              <a:t>Cosas que no se derivan del proyecto.</a:t>
-            </a:r>
-          </a:p>
-          <a:p>
-            <a:pPr lvl="0"/>
-            <a:r>
-              <a:rPr/>
-              <a:t>Lo que digo en el resumen. ¿Está respaldado por el código?</a:t>
-            </a:r>
-          </a:p>
-          <a:p>
-            <a:pPr lvl="0"/>
-            <a:r>
-              <a:rPr/>
-              <a:t>Cual es el alcance del proyecto y posibles limitaciones.</a:t>
-            </a:r>
-          </a:p>
-        </p:txBody>
-      </p:sp>
-    </p:spTree>
-  </p:cSld>
-</p:sld>
-</file>
-
-<file path=ppt/slides/slide23.xml><?xml version="1.0" encoding="utf-8"?>
-<p:sld xmlns:a="http://schemas.openxmlformats.org/drawingml/2006/main" xmlns:r="http://schemas.openxmlformats.org/officeDocument/2006/relationships" xmlns:p="http://schemas.openxmlformats.org/presentationml/2006/main">
-  <p:cSld>
-    <p:spTree>
-      <p:nvGrpSpPr>
-        <p:cNvPr id="1" name=""/>
-        <p:cNvGrpSpPr/>
-        <p:nvPr/>
-      </p:nvGrpSpPr>
-      <p:grpSpPr>
-        <a:xfrm>
-          <a:off x="0" y="0"/>
-          <a:ext cx="0" cy="0"/>
-          <a:chOff x="0" y="0"/>
-          <a:chExt cx="0" cy="0"/>
-        </a:xfrm>
-      </p:grpSpPr>
-      <p:sp>
-        <p:nvSpPr>
-          <p:cNvPr id="2" name="Title 1"/>
-          <p:cNvSpPr>
-            <a:spLocks noGrp="1"/>
-          </p:cNvSpPr>
-          <p:nvPr>
-            <p:ph type="title"/>
-          </p:nvPr>
-        </p:nvSpPr>
-        <p:spPr/>
-        <p:txBody>
-          <a:bodyPr/>
-          <a:lstStyle/>
-          <a:p>
-            <a:pPr lvl="0" indent="0" marL="0">
-              <a:buNone/>
-            </a:pPr>
-            <a:r>
-              <a:rPr/>
-              <a:t>Empresas colaboradoras I</a:t>
-            </a:r>
-          </a:p>
-        </p:txBody>
-      </p:sp>
-      <p:sp>
-        <p:nvSpPr>
-          <p:cNvPr id="3" name="Content Placeholder 2"/>
-          <p:cNvSpPr>
-            <a:spLocks noGrp="1"/>
-          </p:cNvSpPr>
-          <p:nvPr>
-            <p:ph idx="1"/>
-          </p:nvPr>
-        </p:nvSpPr>
-        <p:spPr/>
-        <p:txBody>
-          <a:bodyPr/>
-          <a:lstStyle/>
-          <a:p>
-            <a:pPr lvl="0"/>
-            <a:r>
-              <a:rPr/>
-              <a:t>Depende de la edición.</a:t>
-            </a:r>
-          </a:p>
-          <a:p>
-            <a:pPr lvl="0"/>
-            <a:r>
-              <a:rPr/>
-              <a:t>Una oportunidad para los alumnos.</a:t>
-            </a:r>
-          </a:p>
-          <a:p>
-            <a:pPr lvl="0"/>
-            <a:r>
-              <a:rPr/>
-              <a:t>No hay ninguna distinción a la hora de entregar el TFM. (Mismas condiciones).</a:t>
-            </a:r>
-          </a:p>
-          <a:p>
-            <a:pPr lvl="0"/>
-            <a:r>
-              <a:rPr/>
-              <a:t>Solucionar un problema a una empresa.</a:t>
-            </a:r>
-          </a:p>
-          <a:p>
-            <a:pPr lvl="0"/>
-            <a:r>
-              <a:rPr/>
-              <a:t>¿Atractivo?</a:t>
-            </a:r>
-          </a:p>
-        </p:txBody>
-      </p:sp>
-    </p:spTree>
-  </p:cSld>
-</p:sld>
-</file>
-
-<file path=ppt/slides/slide24.xml><?xml version="1.0" encoding="utf-8"?>
-<p:sld xmlns:a="http://schemas.openxmlformats.org/drawingml/2006/main" xmlns:r="http://schemas.openxmlformats.org/officeDocument/2006/relationships" xmlns:p="http://schemas.openxmlformats.org/presentationml/2006/main">
-  <p:cSld>
-    <p:spTree>
-      <p:nvGrpSpPr>
-        <p:cNvPr id="1" name=""/>
-        <p:cNvGrpSpPr/>
-        <p:nvPr/>
-      </p:nvGrpSpPr>
-      <p:grpSpPr>
-        <a:xfrm>
-          <a:off x="0" y="0"/>
-          <a:ext cx="0" cy="0"/>
-          <a:chOff x="0" y="0"/>
-          <a:chExt cx="0" cy="0"/>
-        </a:xfrm>
-      </p:grpSpPr>
-      <p:sp>
-        <p:nvSpPr>
-          <p:cNvPr id="2" name="Title 1"/>
-          <p:cNvSpPr>
-            <a:spLocks noGrp="1"/>
-          </p:cNvSpPr>
-          <p:nvPr>
-            <p:ph type="title"/>
-          </p:nvPr>
-        </p:nvSpPr>
-        <p:spPr/>
-        <p:txBody>
-          <a:bodyPr/>
-          <a:lstStyle/>
-          <a:p>
-            <a:pPr lvl="0" indent="0" marL="0">
-              <a:buNone/>
-            </a:pPr>
-            <a:r>
-              <a:rPr/>
-              <a:t>Empresas colaboradoras II</a:t>
-            </a:r>
-          </a:p>
-        </p:txBody>
-      </p:sp>
-      <p:sp>
-        <p:nvSpPr>
-          <p:cNvPr id="3" name="Content Placeholder 2"/>
-          <p:cNvSpPr>
-            <a:spLocks noGrp="1"/>
-          </p:cNvSpPr>
-          <p:nvPr>
-            <p:ph idx="1"/>
-          </p:nvPr>
-        </p:nvSpPr>
-        <p:spPr/>
-        <p:txBody>
-          <a:bodyPr/>
-          <a:lstStyle/>
-          <a:p>
-            <a:pPr lvl="0"/>
-            <a:r>
-              <a:rPr/>
-              <a:t>El seguimiento suele hacerse por una persona de la empresa.</a:t>
-            </a:r>
-          </a:p>
-          <a:p>
-            <a:pPr lvl="0"/>
-            <a:r>
-              <a:rPr/>
-              <a:t>Los plazos pueden no coincidir.</a:t>
-            </a:r>
-          </a:p>
-          <a:p>
-            <a:pPr lvl="0"/>
-            <a:r>
-              <a:rPr/>
-              <a:t>¿Se va a entregar lo mismo?</a:t>
-            </a:r>
-          </a:p>
-          <a:p>
-            <a:pPr lvl="0"/>
-            <a:r>
-              <a:rPr/>
-              <a:t>“Matriz de confusión” ¿Contentos? Empresa/Máster.</a:t>
-            </a:r>
-          </a:p>
-        </p:txBody>
-      </p:sp>
-    </p:spTree>
-  </p:cSld>
-</p:sld>
-</file>
-
-<file path=ppt/slides/slide25.xml><?xml version="1.0" encoding="utf-8"?>
-<p:sld xmlns:a="http://schemas.openxmlformats.org/drawingml/2006/main" xmlns:r="http://schemas.openxmlformats.org/officeDocument/2006/relationships" xmlns:p="http://schemas.openxmlformats.org/presentationml/2006/main">
-  <p:cSld>
-    <p:spTree>
-      <p:nvGrpSpPr>
-        <p:cNvPr id="1" name=""/>
-        <p:cNvGrpSpPr/>
-        <p:nvPr/>
-      </p:nvGrpSpPr>
-      <p:grpSpPr>
-        <a:xfrm>
-          <a:off x="0" y="0"/>
-          <a:ext cx="0" cy="0"/>
-          <a:chOff x="0" y="0"/>
-          <a:chExt cx="0" cy="0"/>
-        </a:xfrm>
-      </p:grpSpPr>
-      <p:sp>
-        <p:nvSpPr>
-          <p:cNvPr id="2" name="Title 1"/>
-          <p:cNvSpPr>
-            <a:spLocks noGrp="1"/>
-          </p:cNvSpPr>
-          <p:nvPr>
-            <p:ph type="title"/>
-          </p:nvPr>
-        </p:nvSpPr>
-        <p:spPr/>
-        <p:txBody>
-          <a:bodyPr/>
-          <a:lstStyle/>
-          <a:p>
-            <a:pPr lvl="0" indent="0" marL="0">
-              <a:buNone/>
-            </a:pPr>
-            <a:r>
-              <a:rPr/>
-              <a:t>Datos de nuestra empresa</a:t>
-            </a:r>
-          </a:p>
-        </p:txBody>
-      </p:sp>
-      <p:sp>
-        <p:nvSpPr>
-          <p:cNvPr id="3" name="Content Placeholder 2"/>
-          <p:cNvSpPr>
-            <a:spLocks noGrp="1"/>
-          </p:cNvSpPr>
-          <p:nvPr>
-            <p:ph idx="1"/>
-          </p:nvPr>
-        </p:nvSpPr>
-        <p:spPr/>
-        <p:txBody>
-          <a:bodyPr/>
-          <a:lstStyle/>
-          <a:p>
-            <a:pPr lvl="0"/>
-            <a:r>
-              <a:rPr/>
-              <a:t>¿De verdad nos va a dejar usar los datos de la empresa?</a:t>
-            </a:r>
-          </a:p>
-          <a:p>
-            <a:pPr lvl="0"/>
-            <a:r>
-              <a:rPr/>
-              <a:t>¿Tenemos algo por escrito? Conversaciones de café…</a:t>
-            </a:r>
-          </a:p>
-          <a:p>
-            <a:pPr lvl="0"/>
-            <a:r>
-              <a:rPr/>
-              <a:t>¿Lo han visto los abogados?</a:t>
-            </a:r>
-          </a:p>
-          <a:p>
-            <a:pPr lvl="0"/>
-            <a:r>
-              <a:rPr/>
-              <a:t>Mucho cuidado con los plazos.</a:t>
-            </a:r>
-          </a:p>
-          <a:p>
-            <a:pPr lvl="0"/>
-            <a:r>
-              <a:rPr/>
-              <a:t>Tener un plan B y una fecha para ejecutarlo.</a:t>
-            </a:r>
-          </a:p>
-        </p:txBody>
-      </p:sp>
-    </p:spTree>
-  </p:cSld>
-</p:sld>
-</file>
-
-<file path=ppt/slides/slide26.xml><?xml version="1.0" encoding="utf-8"?>
-<p:sld xmlns:a="http://schemas.openxmlformats.org/drawingml/2006/main" xmlns:r="http://schemas.openxmlformats.org/officeDocument/2006/relationships" xmlns:p="http://schemas.openxmlformats.org/presentationml/2006/main">
-  <p:cSld>
-    <p:spTree>
-      <p:nvGrpSpPr>
-        <p:cNvPr id="1" name=""/>
-        <p:cNvGrpSpPr/>
-        <p:nvPr/>
-      </p:nvGrpSpPr>
-      <p:grpSpPr>
-        <a:xfrm>
-          <a:off x="0" y="0"/>
-          <a:ext cx="0" cy="0"/>
-          <a:chOff x="0" y="0"/>
-          <a:chExt cx="0" cy="0"/>
-        </a:xfrm>
-      </p:grpSpPr>
-      <p:sp>
-        <p:nvSpPr>
-          <p:cNvPr id="2" name="Title 1"/>
-          <p:cNvSpPr>
-            <a:spLocks noGrp="1"/>
-          </p:cNvSpPr>
-          <p:nvPr>
-            <p:ph type="title"/>
-          </p:nvPr>
-        </p:nvSpPr>
-        <p:spPr/>
-        <p:txBody>
-          <a:bodyPr/>
-          <a:lstStyle/>
-          <a:p>
-            <a:pPr lvl="0" indent="0" marL="0">
-              <a:buNone/>
-            </a:pPr>
-            <a:r>
-              <a:rPr/>
-              <a:t>NDA</a:t>
-            </a:r>
-          </a:p>
-        </p:txBody>
-      </p:sp>
-      <p:sp>
-        <p:nvSpPr>
-          <p:cNvPr id="3" name="Content Placeholder 2"/>
-          <p:cNvSpPr>
-            <a:spLocks noGrp="1"/>
-          </p:cNvSpPr>
-          <p:nvPr>
-            <p:ph idx="1"/>
-          </p:nvPr>
-        </p:nvSpPr>
-        <p:spPr/>
-        <p:txBody>
-          <a:bodyPr/>
-          <a:lstStyle/>
-          <a:p>
-            <a:pPr lvl="0"/>
-            <a:r>
-              <a:rPr/>
-              <a:t>El TFM sólo lo vemos Carlos y yo.</a:t>
-            </a:r>
-          </a:p>
-          <a:p>
-            <a:pPr lvl="0"/>
-            <a:r>
-              <a:rPr/>
-              <a:t>No somos empleados de la Universidad. Firmamos a nivel personal.</a:t>
-            </a:r>
-          </a:p>
-          <a:p>
-            <a:pPr lvl="0"/>
-            <a:r>
-              <a:rPr/>
-              <a:t>NDA sencillo.</a:t>
-            </a:r>
-          </a:p>
-          <a:p>
-            <a:pPr lvl="0"/>
-            <a:r>
-              <a:rPr>
-                <a:hlinkClick r:id="rId2"/>
-              </a:rPr>
-              <a:t>Plantilla NDA</a:t>
-            </a:r>
-            <a:r>
-              <a:rPr/>
-              <a:t>.</a:t>
-            </a:r>
-          </a:p>
-          <a:p>
-            <a:pPr lvl="0"/>
-            <a:r>
-              <a:rPr/>
-              <a:t>Fecha.</a:t>
-            </a:r>
-          </a:p>
-          <a:p>
-            <a:pPr lvl="0"/>
-            <a:r>
-              <a:rPr/>
-              <a:t>Es vuestra responsabilidad.</a:t>
-            </a:r>
-          </a:p>
-        </p:txBody>
-      </p:sp>
-    </p:spTree>
-  </p:cSld>
-</p:sld>
-</file>
-
-<file path=ppt/slides/slide27.xml><?xml version="1.0" encoding="utf-8"?>
-<p:sld xmlns:a="http://schemas.openxmlformats.org/drawingml/2006/main" xmlns:r="http://schemas.openxmlformats.org/officeDocument/2006/relationships" xmlns:p="http://schemas.openxmlformats.org/presentationml/2006/main">
-  <p:cSld>
-    <p:spTree>
-      <p:nvGrpSpPr>
-        <p:cNvPr id="1" name=""/>
-        <p:cNvGrpSpPr/>
-        <p:nvPr/>
-      </p:nvGrpSpPr>
-      <p:grpSpPr>
-        <a:xfrm>
-          <a:off x="0" y="0"/>
-          <a:ext cx="0" cy="0"/>
-          <a:chOff x="0" y="0"/>
-          <a:chExt cx="0" cy="0"/>
-        </a:xfrm>
-      </p:grpSpPr>
-      <p:sp>
-        <p:nvSpPr>
-          <p:cNvPr id="2" name="Title 1"/>
-          <p:cNvSpPr>
-            <a:spLocks noGrp="1"/>
-          </p:cNvSpPr>
-          <p:nvPr>
-            <p:ph type="title"/>
-          </p:nvPr>
-        </p:nvSpPr>
-        <p:spPr/>
-        <p:txBody>
-          <a:bodyPr/>
-          <a:lstStyle/>
-          <a:p>
-            <a:pPr lvl="0" indent="0" marL="0">
-              <a:buNone/>
-            </a:pPr>
-            <a:r>
-              <a:rPr/>
-              <a:t>Mas sobre el TFM</a:t>
-            </a:r>
-          </a:p>
-        </p:txBody>
-      </p:sp>
-      <p:sp>
-        <p:nvSpPr>
-          <p:cNvPr id="3" name="Content Placeholder 2"/>
-          <p:cNvSpPr>
-            <a:spLocks noGrp="1"/>
-          </p:cNvSpPr>
-          <p:nvPr>
-            <p:ph idx="1"/>
-          </p:nvPr>
-        </p:nvSpPr>
-        <p:spPr/>
-        <p:txBody>
-          <a:bodyPr/>
-          <a:lstStyle/>
-          <a:p>
-            <a:pPr lvl="0"/>
-            <a:r>
-              <a:rPr/>
-              <a:t>Os puede servir de escaparate.</a:t>
-            </a:r>
-          </a:p>
-          <a:p>
-            <a:pPr lvl="0"/>
-            <a:r>
-              <a:rPr/>
-              <a:t>Página de </a:t>
-            </a:r>
-            <a:r>
-              <a:rPr>
-                <a:hlinkClick r:id="rId2"/>
-              </a:rPr>
-              <a:t>Github</a:t>
-            </a:r>
-            <a:r>
-              <a:rPr/>
-              <a:t> para los reclutadores.</a:t>
-            </a:r>
-          </a:p>
-          <a:p>
-            <a:pPr lvl="0"/>
-            <a:r>
-              <a:rPr>
-                <a:hlinkClick r:id="rId3"/>
-              </a:rPr>
-              <a:t>Github</a:t>
-            </a:r>
-            <a:r>
-              <a:rPr/>
-              <a:t> vs </a:t>
-            </a:r>
-            <a:r>
-              <a:rPr>
-                <a:hlinkClick r:id="rId4"/>
-              </a:rPr>
-              <a:t>Gitlab</a:t>
-            </a:r>
-            <a:r>
-              <a:rPr/>
-              <a:t>.</a:t>
-            </a:r>
-          </a:p>
-          <a:p>
-            <a:pPr lvl="0"/>
-            <a:r>
-              <a:rPr/>
-              <a:t>Mi código es “limpio”.</a:t>
-            </a:r>
-          </a:p>
-          <a:p>
-            <a:pPr lvl="0"/>
-            <a:r>
-              <a:rPr/>
-              <a:t>¿Cuido la imagen del repositorio?</a:t>
-            </a:r>
-          </a:p>
-        </p:txBody>
-      </p:sp>
-    </p:spTree>
-  </p:cSld>
-</p:sld>
-</file>
-
-<file path=ppt/slides/slide28.xml><?xml version="1.0" encoding="utf-8"?>
-<p:sld xmlns:a="http://schemas.openxmlformats.org/drawingml/2006/main" xmlns:r="http://schemas.openxmlformats.org/officeDocument/2006/relationships" xmlns:p="http://schemas.openxmlformats.org/presentationml/2006/main">
-  <p:cSld>
-    <p:spTree>
-      <p:nvGrpSpPr>
-        <p:cNvPr id="1" name=""/>
-        <p:cNvGrpSpPr/>
-        <p:nvPr/>
-      </p:nvGrpSpPr>
-      <p:grpSpPr>
-        <a:xfrm>
-          <a:off x="0" y="0"/>
-          <a:ext cx="0" cy="0"/>
-          <a:chOff x="0" y="0"/>
-          <a:chExt cx="0" cy="0"/>
-        </a:xfrm>
-      </p:grpSpPr>
-      <p:sp>
-        <p:nvSpPr>
-          <p:cNvPr id="2" name="Title 1"/>
-          <p:cNvSpPr>
-            <a:spLocks noGrp="1"/>
-          </p:cNvSpPr>
-          <p:nvPr>
-            <p:ph type="title"/>
-          </p:nvPr>
-        </p:nvSpPr>
-        <p:spPr/>
-        <p:txBody>
-          <a:bodyPr/>
-          <a:lstStyle/>
-          <a:p>
-            <a:pPr lvl="0" indent="0" marL="0">
-              <a:buNone/>
-            </a:pPr>
-            <a:r>
-              <a:rPr/>
-              <a:t>Concurso de becas</a:t>
-            </a:r>
-          </a:p>
-        </p:txBody>
-      </p:sp>
-      <p:sp>
-        <p:nvSpPr>
-          <p:cNvPr id="3" name="Content Placeholder 2"/>
-          <p:cNvSpPr>
-            <a:spLocks noGrp="1"/>
-          </p:cNvSpPr>
-          <p:nvPr>
-            <p:ph idx="1"/>
-          </p:nvPr>
-        </p:nvSpPr>
-        <p:spPr/>
-        <p:txBody>
-          <a:bodyPr/>
-          <a:lstStyle/>
-          <a:p>
-            <a:pPr lvl="0"/>
-            <a:r>
-              <a:rPr/>
-              <a:t>Carlos y yo no tenemos acceso al concurso.</a:t>
-            </a:r>
-          </a:p>
-          <a:p>
-            <a:pPr lvl="0"/>
-            <a:r>
-              <a:rPr/>
-              <a:t>No se valora lo mismo.</a:t>
-            </a:r>
-          </a:p>
-        </p:txBody>
-      </p:sp>
-    </p:spTree>
-  </p:cSld>
-</p:sld>
-</file>
-
-<file path=ppt/slides/slide29.xml><?xml version="1.0" encoding="utf-8"?>
-<p:sld xmlns:a="http://schemas.openxmlformats.org/drawingml/2006/main" xmlns:r="http://schemas.openxmlformats.org/officeDocument/2006/relationships" xmlns:p="http://schemas.openxmlformats.org/presentationml/2006/main">
-  <p:cSld>
-    <p:spTree>
-      <p:nvGrpSpPr>
-        <p:cNvPr id="1" name=""/>
-        <p:cNvGrpSpPr/>
-        <p:nvPr/>
-      </p:nvGrpSpPr>
-      <p:grpSpPr>
-        <a:xfrm>
-          <a:off x="0" y="0"/>
-          <a:ext cx="0" cy="0"/>
-          <a:chOff x="0" y="0"/>
-          <a:chExt cx="0" cy="0"/>
-        </a:xfrm>
-      </p:grpSpPr>
-      <p:sp>
-        <p:nvSpPr>
-          <p:cNvPr id="2" name="Title 1"/>
-          <p:cNvSpPr>
-            <a:spLocks noGrp="1"/>
-          </p:cNvSpPr>
-          <p:nvPr>
-            <p:ph type="title"/>
-          </p:nvPr>
-        </p:nvSpPr>
-        <p:spPr/>
-        <p:txBody>
-          <a:bodyPr/>
-          <a:lstStyle/>
-          <a:p>
-            <a:pPr lvl="0" indent="0" marL="0">
-              <a:buNone/>
-            </a:pPr>
-            <a:r>
-              <a:rPr/>
-              <a:t>Últimas comprobaciones I</a:t>
-            </a:r>
-          </a:p>
-        </p:txBody>
-      </p:sp>
-      <p:sp>
-        <p:nvSpPr>
-          <p:cNvPr id="3" name="Content Placeholder 2"/>
-          <p:cNvSpPr>
-            <a:spLocks noGrp="1"/>
-          </p:cNvSpPr>
-          <p:nvPr>
-            <p:ph idx="1"/>
-          </p:nvPr>
-        </p:nvSpPr>
-        <p:spPr/>
-        <p:txBody>
-          <a:bodyPr/>
-          <a:lstStyle/>
-          <a:p>
-            <a:pPr lvl="0"/>
-            <a:r>
-              <a:rPr/>
-              <a:t>¿Has mirado los derechos de uso de los datos?</a:t>
-            </a:r>
-          </a:p>
-          <a:p>
-            <a:pPr lvl="0"/>
-            <a:r>
-              <a:rPr/>
-              <a:t>¿Tienes el código compartido en un Github o en un Drive? (Acceso)</a:t>
-            </a:r>
-          </a:p>
-          <a:p>
-            <a:pPr lvl="0"/>
-            <a:r>
-              <a:rPr/>
-              <a:t>¿Es accesible para cualquiera desde el link?</a:t>
-            </a:r>
-          </a:p>
-          <a:p>
-            <a:pPr lvl="0"/>
-            <a:r>
-              <a:rPr/>
-              <a:t>¿La memoria ocupa 20 hojas?</a:t>
-            </a:r>
-          </a:p>
-          <a:p>
-            <a:pPr lvl="0"/>
-            <a:r>
-              <a:rPr/>
-              <a:t>¿Tienes el código en los Anexos?</a:t>
-            </a:r>
-          </a:p>
-        </p:txBody>
-      </p:sp>
-    </p:spTree>
-  </p:cSld>
-</p:sld>
-</file>
-
 <file path=ppt/slides/slide3.xml><?xml version="1.0" encoding="utf-8"?>
 <p:sld xmlns:a="http://schemas.openxmlformats.org/drawingml/2006/main" xmlns:r="http://schemas.openxmlformats.org/officeDocument/2006/relationships" xmlns:p="http://schemas.openxmlformats.org/presentationml/2006/main">
   <p:cSld>
@@ -6944,879 +4207,6 @@
           </a:p>
         </p:txBody>
       </p:sp>
-    </p:spTree>
-  </p:cSld>
-</p:sld>
-</file>
-
-<file path=ppt/slides/slide30.xml><?xml version="1.0" encoding="utf-8"?>
-<p:sld xmlns:a="http://schemas.openxmlformats.org/drawingml/2006/main" xmlns:r="http://schemas.openxmlformats.org/officeDocument/2006/relationships" xmlns:p="http://schemas.openxmlformats.org/presentationml/2006/main">
-  <p:cSld>
-    <p:spTree>
-      <p:nvGrpSpPr>
-        <p:cNvPr id="1" name=""/>
-        <p:cNvGrpSpPr/>
-        <p:nvPr/>
-      </p:nvGrpSpPr>
-      <p:grpSpPr>
-        <a:xfrm>
-          <a:off x="0" y="0"/>
-          <a:ext cx="0" cy="0"/>
-          <a:chOff x="0" y="0"/>
-          <a:chExt cx="0" cy="0"/>
-        </a:xfrm>
-      </p:grpSpPr>
-      <p:sp>
-        <p:nvSpPr>
-          <p:cNvPr id="2" name="Title 1"/>
-          <p:cNvSpPr>
-            <a:spLocks noGrp="1"/>
-          </p:cNvSpPr>
-          <p:nvPr>
-            <p:ph type="title"/>
-          </p:nvPr>
-        </p:nvSpPr>
-        <p:spPr/>
-        <p:txBody>
-          <a:bodyPr/>
-          <a:lstStyle/>
-          <a:p>
-            <a:pPr lvl="0" indent="0" marL="0">
-              <a:buNone/>
-            </a:pPr>
-            <a:r>
-              <a:rPr/>
-              <a:t>Últimas comprobaciones II</a:t>
-            </a:r>
-          </a:p>
-        </p:txBody>
-      </p:sp>
-      <p:sp>
-        <p:nvSpPr>
-          <p:cNvPr id="3" name="Content Placeholder 2"/>
-          <p:cNvSpPr>
-            <a:spLocks noGrp="1"/>
-          </p:cNvSpPr>
-          <p:nvPr>
-            <p:ph idx="1"/>
-          </p:nvPr>
-        </p:nvSpPr>
-        <p:spPr/>
-        <p:txBody>
-          <a:bodyPr/>
-          <a:lstStyle/>
-          <a:p>
-            <a:pPr lvl="0"/>
-            <a:r>
-              <a:rPr/>
-              <a:t>¿El proyecto es reproducible?</a:t>
-            </a:r>
-          </a:p>
-          <a:p>
-            <a:pPr lvl="0"/>
-            <a:r>
-              <a:rPr/>
-              <a:t>¿Has incluido un apartado de conclusiones?</a:t>
-            </a:r>
-          </a:p>
-          <a:p>
-            <a:pPr lvl="0"/>
-            <a:r>
-              <a:rPr/>
-              <a:t>¿Has incluido el vídeo (si procede)? Otros vídeos.</a:t>
-            </a:r>
-          </a:p>
-          <a:p>
-            <a:pPr lvl="0"/>
-            <a:r>
-              <a:rPr/>
-              <a:t>¿Incorpora contenido de varias asignaturas o profundiza en algún contenido?</a:t>
-            </a:r>
-          </a:p>
-          <a:p>
-            <a:pPr lvl="0"/>
-            <a:r>
-              <a:rPr/>
-              <a:t>¿Usa software propietario (licencia acceso profesores | darse de alta)?</a:t>
-            </a:r>
-          </a:p>
-        </p:txBody>
-      </p:sp>
-    </p:spTree>
-  </p:cSld>
-</p:sld>
-</file>
-
-<file path=ppt/slides/slide31.xml><?xml version="1.0" encoding="utf-8"?>
-<p:sld xmlns:a="http://schemas.openxmlformats.org/drawingml/2006/main" xmlns:r="http://schemas.openxmlformats.org/officeDocument/2006/relationships" xmlns:p="http://schemas.openxmlformats.org/presentationml/2006/main">
-  <p:cSld>
-    <p:spTree>
-      <p:nvGrpSpPr>
-        <p:cNvPr id="1" name=""/>
-        <p:cNvGrpSpPr/>
-        <p:nvPr/>
-      </p:nvGrpSpPr>
-      <p:grpSpPr>
-        <a:xfrm>
-          <a:off x="0" y="0"/>
-          <a:ext cx="0" cy="0"/>
-          <a:chOff x="0" y="0"/>
-          <a:chExt cx="0" cy="0"/>
-        </a:xfrm>
-      </p:grpSpPr>
-      <p:sp>
-        <p:nvSpPr>
-          <p:cNvPr id="2" name="Title 1"/>
-          <p:cNvSpPr>
-            <a:spLocks noGrp="1"/>
-          </p:cNvSpPr>
-          <p:nvPr>
-            <p:ph type="title"/>
-          </p:nvPr>
-        </p:nvSpPr>
-        <p:spPr/>
-        <p:txBody>
-          <a:bodyPr/>
-          <a:lstStyle/>
-          <a:p>
-            <a:pPr lvl="0" indent="0" marL="0">
-              <a:buNone/>
-            </a:pPr>
-            <a:r>
-              <a:rPr/>
-              <a:t>Consideraciones finales</a:t>
-            </a:r>
-          </a:p>
-        </p:txBody>
-      </p:sp>
-      <p:sp>
-        <p:nvSpPr>
-          <p:cNvPr id="3" name="Content Placeholder 2"/>
-          <p:cNvSpPr>
-            <a:spLocks noGrp="1"/>
-          </p:cNvSpPr>
-          <p:nvPr>
-            <p:ph idx="1"/>
-          </p:nvPr>
-        </p:nvSpPr>
-        <p:spPr/>
-        <p:txBody>
-          <a:bodyPr/>
-          <a:lstStyle/>
-          <a:p>
-            <a:pPr lvl="0"/>
-            <a:r>
-              <a:rPr/>
-              <a:t>Sólo se corrigen las entregas de la plataforma.</a:t>
-            </a:r>
-          </a:p>
-          <a:p>
-            <a:pPr lvl="0"/>
-            <a:r>
-              <a:rPr/>
-              <a:t>La vida media de lo que os enseñamos.</a:t>
-            </a:r>
-          </a:p>
-          <a:p>
-            <a:pPr lvl="0"/>
-            <a:r>
-              <a:rPr/>
-              <a:t>Puede ser una primera carta de presentación.</a:t>
-            </a:r>
-          </a:p>
-          <a:p>
-            <a:pPr lvl="0"/>
-            <a:r>
-              <a:rPr/>
-              <a:t>Es algo vuestro.</a:t>
-            </a:r>
-          </a:p>
-          <a:p>
-            <a:pPr lvl="0"/>
-            <a:r>
-              <a:rPr/>
-              <a:t>La nota no es una suma de cosas -&gt; Fomentar diversidad.</a:t>
-            </a:r>
-          </a:p>
-        </p:txBody>
-      </p:sp>
-    </p:spTree>
-  </p:cSld>
-</p:sld>
-</file>
-
-<file path=ppt/slides/slide32.xml><?xml version="1.0" encoding="utf-8"?>
-<p:sld xmlns:a="http://schemas.openxmlformats.org/drawingml/2006/main" xmlns:r="http://schemas.openxmlformats.org/officeDocument/2006/relationships" xmlns:p="http://schemas.openxmlformats.org/presentationml/2006/main">
-  <p:cSld>
-    <p:spTree>
-      <p:nvGrpSpPr>
-        <p:cNvPr id="1" name=""/>
-        <p:cNvGrpSpPr/>
-        <p:nvPr/>
-      </p:nvGrpSpPr>
-      <p:grpSpPr>
-        <a:xfrm>
-          <a:off x="0" y="0"/>
-          <a:ext cx="0" cy="0"/>
-          <a:chOff x="0" y="0"/>
-          <a:chExt cx="0" cy="0"/>
-        </a:xfrm>
-      </p:grpSpPr>
-      <p:sp>
-        <p:nvSpPr>
-          <p:cNvPr id="2" name="Title 1"/>
-          <p:cNvSpPr>
-            <a:spLocks noGrp="1"/>
-          </p:cNvSpPr>
-          <p:nvPr>
-            <p:ph type="title"/>
-          </p:nvPr>
-        </p:nvSpPr>
-        <p:spPr/>
-        <p:txBody>
-          <a:bodyPr/>
-          <a:lstStyle/>
-          <a:p>
-            <a:pPr lvl="0" indent="0" marL="0">
-              <a:buNone/>
-            </a:pPr>
-            <a:r>
-              <a:rPr/>
-              <a:t>Bonus - Kaggle I</a:t>
-            </a:r>
-          </a:p>
-        </p:txBody>
-      </p:sp>
-      <p:sp>
-        <p:nvSpPr>
-          <p:cNvPr id="3" name="Content Placeholder 2"/>
-          <p:cNvSpPr>
-            <a:spLocks noGrp="1"/>
-          </p:cNvSpPr>
-          <p:nvPr>
-            <p:ph idx="1"/>
-          </p:nvPr>
-        </p:nvSpPr>
-        <p:spPr/>
-        <p:txBody>
-          <a:bodyPr/>
-          <a:lstStyle/>
-          <a:p>
-            <a:pPr lvl="0"/>
-            <a:r>
-              <a:rPr/>
-              <a:t>El premio del millón de dólares de Netflix </a:t>
-            </a:r>
-            <a:r>
-              <a:rPr>
-                <a:hlinkClick r:id="rId2"/>
-              </a:rPr>
-              <a:t>Link con subscripción</a:t>
-            </a:r>
-            <a:r>
-              <a:rPr/>
-              <a:t>.</a:t>
-            </a:r>
-          </a:p>
-          <a:p>
-            <a:pPr lvl="0"/>
-            <a:r>
-              <a:rPr/>
-              <a:t>Marchamo “de facto” para data science (primeros = TRABAJO).</a:t>
-            </a:r>
-          </a:p>
-          <a:p>
-            <a:pPr lvl="0"/>
-            <a:r>
-              <a:rPr/>
-              <a:t>Mas de 200.000 usuarios en todo el mundo ¿Creciendo?</a:t>
-            </a:r>
-          </a:p>
-          <a:p>
-            <a:pPr lvl="0"/>
-            <a:r>
-              <a:rPr/>
-              <a:t>Zona de test para los algoritmos mas avanzados (xgboost).</a:t>
-            </a:r>
-          </a:p>
-          <a:p>
-            <a:pPr lvl="0"/>
-            <a:r>
-              <a:rPr/>
-              <a:t>Adquirido en 2017 por Google.</a:t>
-            </a:r>
-          </a:p>
-        </p:txBody>
-      </p:sp>
-    </p:spTree>
-  </p:cSld>
-</p:sld>
-</file>
-
-<file path=ppt/slides/slide33.xml><?xml version="1.0" encoding="utf-8"?>
-<p:sld xmlns:a="http://schemas.openxmlformats.org/drawingml/2006/main" xmlns:r="http://schemas.openxmlformats.org/officeDocument/2006/relationships" xmlns:p="http://schemas.openxmlformats.org/presentationml/2006/main">
-  <p:cSld>
-    <p:spTree>
-      <p:nvGrpSpPr>
-        <p:cNvPr id="1" name=""/>
-        <p:cNvGrpSpPr/>
-        <p:nvPr/>
-      </p:nvGrpSpPr>
-      <p:grpSpPr>
-        <a:xfrm>
-          <a:off x="0" y="0"/>
-          <a:ext cx="0" cy="0"/>
-          <a:chOff x="0" y="0"/>
-          <a:chExt cx="0" cy="0"/>
-        </a:xfrm>
-      </p:grpSpPr>
-      <p:sp>
-        <p:nvSpPr>
-          <p:cNvPr id="2" name="Title 1"/>
-          <p:cNvSpPr>
-            <a:spLocks noGrp="1"/>
-          </p:cNvSpPr>
-          <p:nvPr>
-            <p:ph type="title"/>
-          </p:nvPr>
-        </p:nvSpPr>
-        <p:spPr/>
-        <p:txBody>
-          <a:bodyPr/>
-          <a:lstStyle/>
-          <a:p>
-            <a:pPr lvl="0" indent="0" marL="0">
-              <a:buNone/>
-            </a:pPr>
-            <a:r>
-              <a:rPr/>
-              <a:t>Bonus - Kaggle II</a:t>
-            </a:r>
-          </a:p>
-        </p:txBody>
-      </p:sp>
-      <p:sp>
-        <p:nvSpPr>
-          <p:cNvPr id="3" name="Content Placeholder 2"/>
-          <p:cNvSpPr>
-            <a:spLocks noGrp="1"/>
-          </p:cNvSpPr>
-          <p:nvPr>
-            <p:ph idx="1"/>
-          </p:nvPr>
-        </p:nvSpPr>
-        <p:spPr/>
-        <p:txBody>
-          <a:bodyPr/>
-          <a:lstStyle/>
-          <a:p>
-            <a:pPr lvl="0"/>
-            <a:r>
-              <a:rPr/>
-              <a:t>¿Por qué puede ser interesante para vosotros? Conocimientos, puestos de trabajo, metodologías, algoritmos y contactos.</a:t>
-            </a:r>
-          </a:p>
-          <a:p>
-            <a:pPr lvl="0"/>
-            <a:r>
-              <a:rPr/>
-              <a:t>Eligir el nombre con cuidado.</a:t>
-            </a:r>
-          </a:p>
-          <a:p>
-            <a:pPr lvl="0"/>
-            <a:r>
-              <a:rPr/>
-              <a:t>Apuntarse a los foros.</a:t>
-            </a:r>
-          </a:p>
-          <a:p>
-            <a:pPr lvl="0"/>
-            <a:r>
-              <a:rPr/>
-              <a:t>Notebooks </a:t>
-            </a:r>
-            <a:r>
-              <a:rPr>
-                <a:hlinkClick r:id="rId2"/>
-              </a:rPr>
-              <a:t>Ejemplo</a:t>
-            </a:r>
-          </a:p>
-          <a:p>
-            <a:pPr lvl="0"/>
-            <a:r>
-              <a:rPr/>
-              <a:t>Si los datos del TFM son de aquí, podéis publicar el TFM.</a:t>
-            </a:r>
-          </a:p>
-        </p:txBody>
-      </p:sp>
-    </p:spTree>
-  </p:cSld>
-</p:sld>
-</file>
-
-<file path=ppt/slides/slide34.xml><?xml version="1.0" encoding="utf-8"?>
-<p:sld xmlns:a="http://schemas.openxmlformats.org/drawingml/2006/main" xmlns:r="http://schemas.openxmlformats.org/officeDocument/2006/relationships" xmlns:p="http://schemas.openxmlformats.org/presentationml/2006/main">
-  <p:cSld>
-    <p:spTree>
-      <p:nvGrpSpPr>
-        <p:cNvPr id="1" name=""/>
-        <p:cNvGrpSpPr/>
-        <p:nvPr/>
-      </p:nvGrpSpPr>
-      <p:grpSpPr>
-        <a:xfrm>
-          <a:off x="0" y="0"/>
-          <a:ext cx="0" cy="0"/>
-          <a:chOff x="0" y="0"/>
-          <a:chExt cx="0" cy="0"/>
-        </a:xfrm>
-      </p:grpSpPr>
-      <p:sp>
-        <p:nvSpPr>
-          <p:cNvPr id="2" name="Title 1"/>
-          <p:cNvSpPr>
-            <a:spLocks noGrp="1"/>
-          </p:cNvSpPr>
-          <p:nvPr>
-            <p:ph type="title"/>
-          </p:nvPr>
-        </p:nvSpPr>
-        <p:spPr/>
-        <p:txBody>
-          <a:bodyPr/>
-          <a:lstStyle/>
-          <a:p>
-            <a:pPr lvl="0" indent="0" marL="0">
-              <a:buNone/>
-            </a:pPr>
-            <a:r>
-              <a:rPr/>
-              <a:t>Bonus - Kaggle III</a:t>
-            </a:r>
-          </a:p>
-        </p:txBody>
-      </p:sp>
-      <p:pic>
-        <p:nvPicPr>
-          <p:cNvPr descr="./figs/Kaggle_Profile_2025-06-09.png" id="0" name="Picture 1"/>
-          <p:cNvPicPr>
-            <a:picLocks noGrp="1" noChangeAspect="1"/>
-          </p:cNvPicPr>
-          <p:nvPr/>
-        </p:nvPicPr>
-        <p:blipFill>
-          <a:blip r:embed="rId2"/>
-          <a:stretch>
-            <a:fillRect/>
-          </a:stretch>
-        </p:blipFill>
-        <p:spPr bwMode="auto">
-          <a:xfrm>
-            <a:off x="1600200" y="1600200"/>
-            <a:ext cx="5930900" cy="4013200"/>
-          </a:xfrm>
-          <a:prstGeom prst="rect">
-            <a:avLst/>
-          </a:prstGeom>
-          <a:noFill/>
-          <a:ln w="9525">
-            <a:noFill/>
-            <a:headEnd/>
-            <a:tailEnd/>
-          </a:ln>
-        </p:spPr>
-      </p:pic>
-      <p:sp>
-        <p:nvSpPr>
-          <p:cNvPr id="1" name="TextBox 3"/>
-          <p:cNvSpPr txBox="1"/>
-          <p:nvPr/>
-        </p:nvSpPr>
-        <p:spPr>
-          <a:xfrm>
-            <a:off x="457200" y="5613400"/>
-            <a:ext cx="8229600" cy="508000"/>
-          </a:xfrm>
-          <a:prstGeom prst="rect">
-            <a:avLst/>
-          </a:prstGeom>
-          <a:noFill/>
-        </p:spPr>
-        <p:txBody>
-          <a:bodyPr/>
-          <a:lstStyle/>
-          <a:p>
-            <a:pPr lvl="0" indent="0" marL="0" algn="ctr">
-              <a:buNone/>
-            </a:pPr>
-            <a:r>
-              <a:rPr/>
-              <a:t>Perfil 2025-06-09</a:t>
-            </a:r>
-          </a:p>
-        </p:txBody>
-      </p:sp>
-      <p:sp>
-        <p:nvSpPr>
-          <p:cNvPr id="3" name="Content Placeholder 2"/>
-          <p:cNvSpPr>
-            <a:spLocks noGrp="1"/>
-          </p:cNvSpPr>
-          <p:nvPr>
-            <p:ph idx="1"/>
-          </p:nvPr>
-        </p:nvSpPr>
-        <p:spPr/>
-        <p:txBody>
-          <a:bodyPr/>
-          <a:lstStyle/>
-          <a:p>
-            <a:pPr lvl="0" indent="0" marL="0">
-              <a:buNone/>
-            </a:pPr>
-            <a:r>
-              <a:rPr>
-                <a:hlinkClick r:id="rId3"/>
-              </a:rPr>
-              <a:t>Mi perfil en Kaggle</a:t>
-            </a:r>
-          </a:p>
-        </p:txBody>
-      </p:sp>
-    </p:spTree>
-  </p:cSld>
-</p:sld>
-</file>
-
-<file path=ppt/slides/slide35.xml><?xml version="1.0" encoding="utf-8"?>
-<p:sld xmlns:a="http://schemas.openxmlformats.org/drawingml/2006/main" xmlns:r="http://schemas.openxmlformats.org/officeDocument/2006/relationships" xmlns:p="http://schemas.openxmlformats.org/presentationml/2006/main">
-  <p:cSld>
-    <p:spTree>
-      <p:nvGrpSpPr>
-        <p:cNvPr id="1" name=""/>
-        <p:cNvGrpSpPr/>
-        <p:nvPr/>
-      </p:nvGrpSpPr>
-      <p:grpSpPr>
-        <a:xfrm>
-          <a:off x="0" y="0"/>
-          <a:ext cx="0" cy="0"/>
-          <a:chOff x="0" y="0"/>
-          <a:chExt cx="0" cy="0"/>
-        </a:xfrm>
-      </p:grpSpPr>
-      <p:sp>
-        <p:nvSpPr>
-          <p:cNvPr id="2" name="Title 1"/>
-          <p:cNvSpPr>
-            <a:spLocks noGrp="1"/>
-          </p:cNvSpPr>
-          <p:nvPr>
-            <p:ph type="title"/>
-          </p:nvPr>
-        </p:nvSpPr>
-        <p:spPr/>
-        <p:txBody>
-          <a:bodyPr/>
-          <a:lstStyle/>
-          <a:p>
-            <a:pPr lvl="0" indent="0" marL="0">
-              <a:buNone/>
-            </a:pPr>
-            <a:r>
-              <a:rPr/>
-              <a:t>Bonus - Kaggle IV</a:t>
-            </a:r>
-          </a:p>
-        </p:txBody>
-      </p:sp>
-      <p:pic>
-        <p:nvPicPr>
-          <p:cNvPr descr="./figs/Kaggle_perfil_viejo.png" id="0" name="Picture 1"/>
-          <p:cNvPicPr>
-            <a:picLocks noGrp="1" noChangeAspect="1"/>
-          </p:cNvPicPr>
-          <p:nvPr/>
-        </p:nvPicPr>
-        <p:blipFill>
-          <a:blip r:embed="rId2"/>
-          <a:stretch>
-            <a:fillRect/>
-          </a:stretch>
-        </p:blipFill>
-        <p:spPr bwMode="auto">
-          <a:xfrm>
-            <a:off x="1193800" y="1600200"/>
-            <a:ext cx="6743700" cy="4013200"/>
-          </a:xfrm>
-          <a:prstGeom prst="rect">
-            <a:avLst/>
-          </a:prstGeom>
-          <a:noFill/>
-          <a:ln w="9525">
-            <a:noFill/>
-            <a:headEnd/>
-            <a:tailEnd/>
-          </a:ln>
-        </p:spPr>
-      </p:pic>
-      <p:sp>
-        <p:nvSpPr>
-          <p:cNvPr id="1" name="TextBox 3"/>
-          <p:cNvSpPr txBox="1"/>
-          <p:nvPr/>
-        </p:nvSpPr>
-        <p:spPr>
-          <a:xfrm>
-            <a:off x="457200" y="5613400"/>
-            <a:ext cx="8229600" cy="508000"/>
-          </a:xfrm>
-          <a:prstGeom prst="rect">
-            <a:avLst/>
-          </a:prstGeom>
-          <a:noFill/>
-        </p:spPr>
-        <p:txBody>
-          <a:bodyPr/>
-          <a:lstStyle/>
-          <a:p>
-            <a:pPr lvl="0" indent="0" marL="0" algn="ctr">
-              <a:buNone/>
-            </a:pPr>
-            <a:r>
-              <a:rPr/>
-              <a:t>Perfil 2013</a:t>
-            </a:r>
-          </a:p>
-        </p:txBody>
-      </p:sp>
-    </p:spTree>
-  </p:cSld>
-</p:sld>
-</file>
-
-<file path=ppt/slides/slide36.xml><?xml version="1.0" encoding="utf-8"?>
-<p:sld xmlns:a="http://schemas.openxmlformats.org/drawingml/2006/main" xmlns:r="http://schemas.openxmlformats.org/officeDocument/2006/relationships" xmlns:p="http://schemas.openxmlformats.org/presentationml/2006/main">
-  <p:cSld>
-    <p:spTree>
-      <p:nvGrpSpPr>
-        <p:cNvPr id="1" name=""/>
-        <p:cNvGrpSpPr/>
-        <p:nvPr/>
-      </p:nvGrpSpPr>
-      <p:grpSpPr>
-        <a:xfrm>
-          <a:off x="0" y="0"/>
-          <a:ext cx="0" cy="0"/>
-          <a:chOff x="0" y="0"/>
-          <a:chExt cx="0" cy="0"/>
-        </a:xfrm>
-      </p:grpSpPr>
-      <p:sp>
-        <p:nvSpPr>
-          <p:cNvPr id="2" name="Title 1"/>
-          <p:cNvSpPr>
-            <a:spLocks noGrp="1"/>
-          </p:cNvSpPr>
-          <p:nvPr>
-            <p:ph type="title"/>
-          </p:nvPr>
-        </p:nvSpPr>
-        <p:spPr/>
-        <p:txBody>
-          <a:bodyPr/>
-          <a:lstStyle/>
-          <a:p>
-            <a:pPr lvl="0" indent="0" marL="0">
-              <a:buNone/>
-            </a:pPr>
-            <a:r>
-              <a:rPr/>
-              <a:t>Bonus - Kaggle V</a:t>
-            </a:r>
-          </a:p>
-        </p:txBody>
-      </p:sp>
-      <p:pic>
-        <p:nvPicPr>
-          <p:cNvPr descr="./figs/Kaggle_mug.jpg" id="0" name="Picture 1"/>
-          <p:cNvPicPr>
-            <a:picLocks noGrp="1" noChangeAspect="1"/>
-          </p:cNvPicPr>
-          <p:nvPr/>
-        </p:nvPicPr>
-        <p:blipFill>
-          <a:blip r:embed="rId2"/>
-          <a:stretch>
-            <a:fillRect/>
-          </a:stretch>
-        </p:blipFill>
-        <p:spPr bwMode="auto">
-          <a:xfrm>
-            <a:off x="1562100" y="1600200"/>
-            <a:ext cx="6019800" cy="4521200"/>
-          </a:xfrm>
-          <a:prstGeom prst="rect">
-            <a:avLst/>
-          </a:prstGeom>
-          <a:noFill/>
-          <a:ln w="9525">
-            <a:noFill/>
-            <a:headEnd/>
-            <a:tailEnd/>
-          </a:ln>
-        </p:spPr>
-      </p:pic>
-    </p:spTree>
-  </p:cSld>
-</p:sld>
-</file>
-
-<file path=ppt/slides/slide37.xml><?xml version="1.0" encoding="utf-8"?>
-<p:sld xmlns:a="http://schemas.openxmlformats.org/drawingml/2006/main" xmlns:r="http://schemas.openxmlformats.org/officeDocument/2006/relationships" xmlns:p="http://schemas.openxmlformats.org/presentationml/2006/main">
-  <p:cSld>
-    <p:spTree>
-      <p:nvGrpSpPr>
-        <p:cNvPr id="1" name=""/>
-        <p:cNvGrpSpPr/>
-        <p:nvPr/>
-      </p:nvGrpSpPr>
-      <p:grpSpPr>
-        <a:xfrm>
-          <a:off x="0" y="0"/>
-          <a:ext cx="0" cy="0"/>
-          <a:chOff x="0" y="0"/>
-          <a:chExt cx="0" cy="0"/>
-        </a:xfrm>
-      </p:grpSpPr>
-      <p:sp>
-        <p:nvSpPr>
-          <p:cNvPr id="2" name="Title 1"/>
-          <p:cNvSpPr>
-            <a:spLocks noGrp="1"/>
-          </p:cNvSpPr>
-          <p:nvPr>
-            <p:ph type="title"/>
-          </p:nvPr>
-        </p:nvSpPr>
-        <p:spPr>
-          <a:xfrm>
-            <a:off x="457200" y="273050"/>
-            <a:ext cx="3008313" cy="1162050"/>
-          </a:xfrm>
-        </p:spPr>
-        <p:txBody>
-          <a:bodyPr/>
-          <a:lstStyle/>
-          <a:p>
-            <a:pPr lvl="0" indent="0" marL="0">
-              <a:buNone/>
-            </a:pPr>
-            <a:r>
-              <a:rPr/>
-              <a:t>¡Gracias!</a:t>
-            </a:r>
-          </a:p>
-        </p:txBody>
-      </p:sp>
-      <p:sp>
-        <p:nvSpPr>
-          <p:cNvPr id="4" name="Text Placeholder 3"/>
-          <p:cNvSpPr>
-            <a:spLocks noGrp="1"/>
-          </p:cNvSpPr>
-          <p:nvPr>
-            <p:ph idx="2" sz="half" type="body"/>
-          </p:nvPr>
-        </p:nvSpPr>
-        <p:spPr/>
-        <p:txBody>
-          <a:bodyPr/>
-          <a:lstStyle/>
-          <a:p>
-            <a:pPr lvl="0"/>
-            <a:r>
-              <a:rPr/>
-              <a:t>Santiago Mota </a:t>
-            </a:r>
-            <a:r>
-              <a:rPr>
-                <a:hlinkClick r:id="rId2"/>
-              </a:rPr>
-              <a:t>LinkedIn</a:t>
-            </a:r>
-          </a:p>
-          <a:p>
-            <a:pPr lvl="0"/>
-            <a:r>
-              <a:rPr>
-                <a:hlinkClick r:id="rId3"/>
-              </a:rPr>
-              <a:t>santiago_mota@yahoo.es</a:t>
-            </a:r>
-          </a:p>
-          <a:p>
-            <a:pPr lvl="0"/>
-            <a:r>
-              <a:rPr>
-                <a:hlinkClick r:id="rId4"/>
-              </a:rPr>
-              <a:t>Github Santiago Mota</a:t>
-            </a:r>
-          </a:p>
-          <a:p>
-            <a:pPr lvl="0"/>
-            <a:r>
-              <a:rPr>
-                <a:hlinkClick r:id="rId5"/>
-              </a:rPr>
-              <a:t>Esta presentación online</a:t>
-            </a:r>
-          </a:p>
-          <a:p>
-            <a:pPr lvl="0"/>
-            <a:r>
-              <a:rPr>
-                <a:hlinkClick r:id="rId6"/>
-              </a:rPr>
-              <a:t>Repositorio Github de esta presentación</a:t>
-            </a:r>
-          </a:p>
-        </p:txBody>
-      </p:sp>
-      <p:pic>
-        <p:nvPicPr>
-          <p:cNvPr descr="./figs/Concurso_presentacion_Github.svg" id="0" name="Picture 1"/>
-          <p:cNvPicPr>
-            <a:picLocks noGrp="1" noChangeAspect="1"/>
-          </p:cNvPicPr>
-          <p:nvPr/>
-        </p:nvPicPr>
-        <p:blipFill>
-          <a:blip r:embed="rId7"/>
-          <a:stretch>
-            <a:fillRect/>
-          </a:stretch>
-        </p:blipFill>
-        <p:spPr bwMode="auto">
-          <a:xfrm>
-            <a:off x="3568700" y="635000"/>
-            <a:ext cx="5105400" cy="5105400"/>
-          </a:xfrm>
-          <a:prstGeom prst="rect">
-            <a:avLst/>
-          </a:prstGeom>
-          <a:noFill/>
-          <a:ln w="9525">
-            <a:noFill/>
-            <a:headEnd/>
-            <a:tailEnd/>
-          </a:ln>
-        </p:spPr>
-      </p:pic>
     </p:spTree>
   </p:cSld>
 </p:sld>
@@ -8006,7 +4396,13 @@
             <a:pPr lvl="0"/>
             <a:r>
               <a:rPr/>
-              <a:t>Implementación: Se aportan varios ejemplos en el repositorio [link]</a:t>
+              <a:t>Implementación: Se aportan varios ejemplos en el repositorio </a:t>
+            </a:r>
+            <a:r>
+              <a:rPr>
+                <a:hlinkClick r:id="rId2"/>
+              </a:rPr>
+              <a:t>link</a:t>
             </a:r>
           </a:p>
         </p:txBody>
@@ -8173,7 +4569,17 @@
             <a:pPr lvl="0"/>
             <a:r>
               <a:rPr/>
-              <a:t>Implementación: Se ha desarrollado un código en el repositorio [link] para recorrer la página web y transformar los ficheros </a:t>
+              <a:t>Implementación: Se ha desarrollado un código en el repositorio </a:t>
+            </a:r>
+            <a:r>
+              <a:rPr>
+                <a:hlinkClick r:id="rId2"/>
+              </a:rPr>
+              <a:t>link</a:t>
+            </a:r>
+            <a:r>
+              <a:rPr/>
+              <a:t> para recorrer la página web y transformar los ficheros </a:t>
             </a:r>
             <a:r>
               <a:rPr>
@@ -8200,7 +4606,7 @@
             <a:pPr lvl="0"/>
             <a:r>
               <a:rPr b="1">
-                <a:hlinkClick r:id="rId2"/>
+                <a:hlinkClick r:id="rId3"/>
               </a:rPr>
               <a:t>madrid_csv_to_parquet.py</a:t>
             </a:r>

</xml_diff>

<commit_message>
Incluimos la versión pdf
</commit_message>
<xml_diff>
--- a/docs/index.pptx
+++ b/docs/index.pptx
@@ -3549,7 +3549,7 @@
             </a:pPr>
             <a:r>
               <a:rPr/>
-              <a:t>Resumen I</a:t>
+              <a:t>Resumen</a:t>
             </a:r>
           </a:p>
         </p:txBody>
@@ -3593,7 +3593,7 @@
             <a:pPr lvl="0"/>
             <a:r>
               <a:rPr/>
-              <a:t>Son bastante sencillas de implentar y se aportan varios ejemplos funcionales en las internas.</a:t>
+              <a:t>Son bastante sencillas de implementar y se aportan varios ejemplos funcionales en las internas.</a:t>
             </a:r>
           </a:p>
         </p:txBody>
@@ -4204,7 +4204,7 @@
               <a:rPr>
                 <a:hlinkClick r:id="rId2"/>
               </a:rPr>
-              <a:t>link</a:t>
+              <a:t>Link</a:t>
             </a:r>
           </a:p>
         </p:txBody>
@@ -4377,7 +4377,7 @@
               <a:rPr>
                 <a:hlinkClick r:id="rId2"/>
               </a:rPr>
-              <a:t>link</a:t>
+              <a:t>Link</a:t>
             </a:r>
             <a:r>
               <a:rPr/>

</xml_diff>